<commit_message>
Manage map moves with drag and drop pattern
</commit_message>
<xml_diff>
--- a/Design.pptx
+++ b/Design.pptx
@@ -289,7 +289,7 @@
           <a:p>
             <a:fld id="{EDA4E989-5FC3-5745-A2D3-518FB16C4A55}" type="datetimeFigureOut">
               <a:rPr lang="fr-FR" smtClean="0"/>
-              <a:t>24/07/16</a:t>
+              <a:t>27/07/16</a:t>
             </a:fld>
             <a:endParaRPr lang="fr-FR"/>
           </a:p>
@@ -459,7 +459,7 @@
           <a:p>
             <a:fld id="{EDA4E989-5FC3-5745-A2D3-518FB16C4A55}" type="datetimeFigureOut">
               <a:rPr lang="fr-FR" smtClean="0"/>
-              <a:t>24/07/16</a:t>
+              <a:t>27/07/16</a:t>
             </a:fld>
             <a:endParaRPr lang="fr-FR"/>
           </a:p>
@@ -639,7 +639,7 @@
           <a:p>
             <a:fld id="{EDA4E989-5FC3-5745-A2D3-518FB16C4A55}" type="datetimeFigureOut">
               <a:rPr lang="fr-FR" smtClean="0"/>
-              <a:t>24/07/16</a:t>
+              <a:t>27/07/16</a:t>
             </a:fld>
             <a:endParaRPr lang="fr-FR"/>
           </a:p>
@@ -809,7 +809,7 @@
           <a:p>
             <a:fld id="{EDA4E989-5FC3-5745-A2D3-518FB16C4A55}" type="datetimeFigureOut">
               <a:rPr lang="fr-FR" smtClean="0"/>
-              <a:t>24/07/16</a:t>
+              <a:t>27/07/16</a:t>
             </a:fld>
             <a:endParaRPr lang="fr-FR"/>
           </a:p>
@@ -1055,7 +1055,7 @@
           <a:p>
             <a:fld id="{EDA4E989-5FC3-5745-A2D3-518FB16C4A55}" type="datetimeFigureOut">
               <a:rPr lang="fr-FR" smtClean="0"/>
-              <a:t>24/07/16</a:t>
+              <a:t>27/07/16</a:t>
             </a:fld>
             <a:endParaRPr lang="fr-FR"/>
           </a:p>
@@ -1343,7 +1343,7 @@
           <a:p>
             <a:fld id="{EDA4E989-5FC3-5745-A2D3-518FB16C4A55}" type="datetimeFigureOut">
               <a:rPr lang="fr-FR" smtClean="0"/>
-              <a:t>24/07/16</a:t>
+              <a:t>27/07/16</a:t>
             </a:fld>
             <a:endParaRPr lang="fr-FR"/>
           </a:p>
@@ -1765,7 +1765,7 @@
           <a:p>
             <a:fld id="{EDA4E989-5FC3-5745-A2D3-518FB16C4A55}" type="datetimeFigureOut">
               <a:rPr lang="fr-FR" smtClean="0"/>
-              <a:t>24/07/16</a:t>
+              <a:t>27/07/16</a:t>
             </a:fld>
             <a:endParaRPr lang="fr-FR"/>
           </a:p>
@@ -1883,7 +1883,7 @@
           <a:p>
             <a:fld id="{EDA4E989-5FC3-5745-A2D3-518FB16C4A55}" type="datetimeFigureOut">
               <a:rPr lang="fr-FR" smtClean="0"/>
-              <a:t>24/07/16</a:t>
+              <a:t>27/07/16</a:t>
             </a:fld>
             <a:endParaRPr lang="fr-FR"/>
           </a:p>
@@ -1978,7 +1978,7 @@
           <a:p>
             <a:fld id="{EDA4E989-5FC3-5745-A2D3-518FB16C4A55}" type="datetimeFigureOut">
               <a:rPr lang="fr-FR" smtClean="0"/>
-              <a:t>24/07/16</a:t>
+              <a:t>27/07/16</a:t>
             </a:fld>
             <a:endParaRPr lang="fr-FR"/>
           </a:p>
@@ -2255,7 +2255,7 @@
           <a:p>
             <a:fld id="{EDA4E989-5FC3-5745-A2D3-518FB16C4A55}" type="datetimeFigureOut">
               <a:rPr lang="fr-FR" smtClean="0"/>
-              <a:t>24/07/16</a:t>
+              <a:t>27/07/16</a:t>
             </a:fld>
             <a:endParaRPr lang="fr-FR"/>
           </a:p>
@@ -2508,7 +2508,7 @@
           <a:p>
             <a:fld id="{EDA4E989-5FC3-5745-A2D3-518FB16C4A55}" type="datetimeFigureOut">
               <a:rPr lang="fr-FR" smtClean="0"/>
-              <a:t>24/07/16</a:t>
+              <a:t>27/07/16</a:t>
             </a:fld>
             <a:endParaRPr lang="fr-FR"/>
           </a:p>
@@ -2721,7 +2721,7 @@
           <a:p>
             <a:fld id="{EDA4E989-5FC3-5745-A2D3-518FB16C4A55}" type="datetimeFigureOut">
               <a:rPr lang="fr-FR" smtClean="0"/>
-              <a:t>24/07/16</a:t>
+              <a:t>27/07/16</a:t>
             </a:fld>
             <a:endParaRPr lang="fr-FR"/>
           </a:p>
@@ -7988,6 +7988,4700 @@
                 <a:schemeClr val="bg1"/>
               </a:solidFill>
             </a:endParaRPr>
+          </a:p>
+        </p:txBody>
+      </p:sp>
+      <p:sp>
+        <p:nvSpPr>
+          <p:cNvPr id="16" name="Rectangle 15"/>
+          <p:cNvSpPr/>
+          <p:nvPr/>
+        </p:nvSpPr>
+        <p:spPr>
+          <a:xfrm rot="16200000">
+            <a:off x="3627213" y="734233"/>
+            <a:ext cx="226484" cy="2165850"/>
+          </a:xfrm>
+          <a:prstGeom prst="rect">
+            <a:avLst/>
+          </a:prstGeom>
+          <a:solidFill>
+            <a:schemeClr val="bg1">
+              <a:lumMod val="85000"/>
+            </a:schemeClr>
+          </a:solidFill>
+          <a:ln>
+            <a:noFill/>
+          </a:ln>
+          <a:effectLst/>
+        </p:spPr>
+        <p:style>
+          <a:lnRef idx="1">
+            <a:schemeClr val="accent1"/>
+          </a:lnRef>
+          <a:fillRef idx="3">
+            <a:schemeClr val="accent1"/>
+          </a:fillRef>
+          <a:effectRef idx="2">
+            <a:schemeClr val="accent1"/>
+          </a:effectRef>
+          <a:fontRef idx="minor">
+            <a:schemeClr val="lt1"/>
+          </a:fontRef>
+        </p:style>
+        <p:txBody>
+          <a:bodyPr rtlCol="0" anchor="ctr"/>
+          <a:lstStyle/>
+          <a:p>
+            <a:pPr algn="ctr"/>
+            <a:endParaRPr lang="fr-FR"/>
+          </a:p>
+        </p:txBody>
+      </p:sp>
+      <p:sp>
+        <p:nvSpPr>
+          <p:cNvPr id="19" name="Rectangle 18"/>
+          <p:cNvSpPr/>
+          <p:nvPr/>
+        </p:nvSpPr>
+        <p:spPr>
+          <a:xfrm rot="10800000">
+            <a:off x="4131833" y="910287"/>
+            <a:ext cx="135468" cy="296213"/>
+          </a:xfrm>
+          <a:prstGeom prst="rect">
+            <a:avLst/>
+          </a:prstGeom>
+          <a:noFill/>
+          <a:ln w="3175" cmpd="sng">
+            <a:solidFill>
+              <a:schemeClr val="tx1"/>
+            </a:solidFill>
+          </a:ln>
+          <a:effectLst/>
+        </p:spPr>
+        <p:style>
+          <a:lnRef idx="1">
+            <a:schemeClr val="accent1"/>
+          </a:lnRef>
+          <a:fillRef idx="3">
+            <a:schemeClr val="accent1"/>
+          </a:fillRef>
+          <a:effectRef idx="2">
+            <a:schemeClr val="accent1"/>
+          </a:effectRef>
+          <a:fontRef idx="minor">
+            <a:schemeClr val="lt1"/>
+          </a:fontRef>
+        </p:style>
+        <p:txBody>
+          <a:bodyPr rtlCol="0" anchor="ctr"/>
+          <a:lstStyle/>
+          <a:p>
+            <a:pPr algn="ctr"/>
+            <a:endParaRPr lang="fr-FR"/>
+          </a:p>
+        </p:txBody>
+      </p:sp>
+      <p:sp>
+        <p:nvSpPr>
+          <p:cNvPr id="21" name="Rectangle 20"/>
+          <p:cNvSpPr/>
+          <p:nvPr/>
+        </p:nvSpPr>
+        <p:spPr>
+          <a:xfrm rot="16200000">
+            <a:off x="4878105" y="1553368"/>
+            <a:ext cx="226484" cy="4671866"/>
+          </a:xfrm>
+          <a:prstGeom prst="rect">
+            <a:avLst/>
+          </a:prstGeom>
+          <a:solidFill>
+            <a:schemeClr val="bg1">
+              <a:lumMod val="85000"/>
+            </a:schemeClr>
+          </a:solidFill>
+          <a:ln>
+            <a:noFill/>
+          </a:ln>
+          <a:effectLst/>
+        </p:spPr>
+        <p:style>
+          <a:lnRef idx="1">
+            <a:schemeClr val="accent1"/>
+          </a:lnRef>
+          <a:fillRef idx="3">
+            <a:schemeClr val="accent1"/>
+          </a:fillRef>
+          <a:effectRef idx="2">
+            <a:schemeClr val="accent1"/>
+          </a:effectRef>
+          <a:fontRef idx="minor">
+            <a:schemeClr val="lt1"/>
+          </a:fontRef>
+        </p:style>
+        <p:txBody>
+          <a:bodyPr rtlCol="0" anchor="ctr"/>
+          <a:lstStyle/>
+          <a:p>
+            <a:pPr algn="ctr"/>
+            <a:endParaRPr lang="fr-FR"/>
+          </a:p>
+        </p:txBody>
+      </p:sp>
+      <p:sp>
+        <p:nvSpPr>
+          <p:cNvPr id="23" name="Rectangle 22"/>
+          <p:cNvSpPr/>
+          <p:nvPr/>
+        </p:nvSpPr>
+        <p:spPr>
+          <a:xfrm>
+            <a:off x="2657530" y="1703914"/>
+            <a:ext cx="226484" cy="3833286"/>
+          </a:xfrm>
+          <a:prstGeom prst="rect">
+            <a:avLst/>
+          </a:prstGeom>
+          <a:solidFill>
+            <a:schemeClr val="bg1">
+              <a:lumMod val="85000"/>
+            </a:schemeClr>
+          </a:solidFill>
+          <a:ln>
+            <a:noFill/>
+          </a:ln>
+          <a:effectLst/>
+        </p:spPr>
+        <p:style>
+          <a:lnRef idx="1">
+            <a:schemeClr val="accent1"/>
+          </a:lnRef>
+          <a:fillRef idx="3">
+            <a:schemeClr val="accent1"/>
+          </a:fillRef>
+          <a:effectRef idx="2">
+            <a:schemeClr val="accent1"/>
+          </a:effectRef>
+          <a:fontRef idx="minor">
+            <a:schemeClr val="lt1"/>
+          </a:fontRef>
+        </p:style>
+        <p:txBody>
+          <a:bodyPr rtlCol="0" anchor="ctr"/>
+          <a:lstStyle/>
+          <a:p>
+            <a:pPr algn="ctr"/>
+            <a:endParaRPr lang="fr-FR"/>
+          </a:p>
+        </p:txBody>
+      </p:sp>
+      <p:sp>
+        <p:nvSpPr>
+          <p:cNvPr id="25" name="Rectangle 24"/>
+          <p:cNvSpPr/>
+          <p:nvPr/>
+        </p:nvSpPr>
+        <p:spPr>
+          <a:xfrm rot="16200000">
+            <a:off x="4879163" y="3089083"/>
+            <a:ext cx="226484" cy="4669750"/>
+          </a:xfrm>
+          <a:prstGeom prst="rect">
+            <a:avLst/>
+          </a:prstGeom>
+          <a:solidFill>
+            <a:schemeClr val="bg1">
+              <a:lumMod val="85000"/>
+            </a:schemeClr>
+          </a:solidFill>
+          <a:ln>
+            <a:noFill/>
+          </a:ln>
+          <a:effectLst/>
+        </p:spPr>
+        <p:style>
+          <a:lnRef idx="1">
+            <a:schemeClr val="accent1"/>
+          </a:lnRef>
+          <a:fillRef idx="3">
+            <a:schemeClr val="accent1"/>
+          </a:fillRef>
+          <a:effectRef idx="2">
+            <a:schemeClr val="accent1"/>
+          </a:effectRef>
+          <a:fontRef idx="minor">
+            <a:schemeClr val="lt1"/>
+          </a:fontRef>
+        </p:style>
+        <p:txBody>
+          <a:bodyPr rtlCol="0" anchor="ctr"/>
+          <a:lstStyle/>
+          <a:p>
+            <a:pPr algn="ctr"/>
+            <a:endParaRPr lang="fr-FR"/>
+          </a:p>
+        </p:txBody>
+      </p:sp>
+      <p:sp>
+        <p:nvSpPr>
+          <p:cNvPr id="30" name="Rectangle 29"/>
+          <p:cNvSpPr/>
+          <p:nvPr/>
+        </p:nvSpPr>
+        <p:spPr>
+          <a:xfrm>
+            <a:off x="4422570" y="1703914"/>
+            <a:ext cx="226484" cy="3833286"/>
+          </a:xfrm>
+          <a:prstGeom prst="rect">
+            <a:avLst/>
+          </a:prstGeom>
+          <a:solidFill>
+            <a:schemeClr val="bg1">
+              <a:lumMod val="85000"/>
+            </a:schemeClr>
+          </a:solidFill>
+          <a:ln>
+            <a:noFill/>
+          </a:ln>
+          <a:effectLst/>
+        </p:spPr>
+        <p:style>
+          <a:lnRef idx="1">
+            <a:schemeClr val="accent1"/>
+          </a:lnRef>
+          <a:fillRef idx="3">
+            <a:schemeClr val="accent1"/>
+          </a:fillRef>
+          <a:effectRef idx="2">
+            <a:schemeClr val="accent1"/>
+          </a:effectRef>
+          <a:fontRef idx="minor">
+            <a:schemeClr val="lt1"/>
+          </a:fontRef>
+        </p:style>
+        <p:txBody>
+          <a:bodyPr rtlCol="0" anchor="ctr"/>
+          <a:lstStyle/>
+          <a:p>
+            <a:pPr algn="ctr"/>
+            <a:endParaRPr lang="fr-FR"/>
+          </a:p>
+        </p:txBody>
+      </p:sp>
+      <p:grpSp>
+        <p:nvGrpSpPr>
+          <p:cNvPr id="39" name="Grouper 38"/>
+          <p:cNvGrpSpPr/>
+          <p:nvPr/>
+        </p:nvGrpSpPr>
+        <p:grpSpPr>
+          <a:xfrm>
+            <a:off x="2882901" y="4021593"/>
+            <a:ext cx="613834" cy="257973"/>
+            <a:chOff x="2597151" y="4019475"/>
+            <a:chExt cx="471915" cy="146125"/>
+          </a:xfrm>
+        </p:grpSpPr>
+        <p:cxnSp>
+          <p:nvCxnSpPr>
+            <p:cNvPr id="40" name="Connecteur droit 39"/>
+            <p:cNvCxnSpPr/>
+            <p:nvPr/>
+          </p:nvCxnSpPr>
+          <p:spPr>
+            <a:xfrm flipV="1">
+              <a:off x="2841932" y="4019475"/>
+              <a:ext cx="0" cy="146125"/>
+            </a:xfrm>
+            <a:prstGeom prst="line">
+              <a:avLst/>
+            </a:prstGeom>
+            <a:ln w="76200" cmpd="sng">
+              <a:solidFill>
+                <a:schemeClr val="tx1"/>
+              </a:solidFill>
+            </a:ln>
+            <a:effectLst/>
+          </p:spPr>
+          <p:style>
+            <a:lnRef idx="2">
+              <a:schemeClr val="accent1"/>
+            </a:lnRef>
+            <a:fillRef idx="0">
+              <a:schemeClr val="accent1"/>
+            </a:fillRef>
+            <a:effectRef idx="1">
+              <a:schemeClr val="accent1"/>
+            </a:effectRef>
+            <a:fontRef idx="minor">
+              <a:schemeClr val="tx1"/>
+            </a:fontRef>
+          </p:style>
+        </p:cxnSp>
+        <p:cxnSp>
+          <p:nvCxnSpPr>
+            <p:cNvPr id="41" name="Connecteur droit 40"/>
+            <p:cNvCxnSpPr/>
+            <p:nvPr/>
+          </p:nvCxnSpPr>
+          <p:spPr>
+            <a:xfrm flipH="1">
+              <a:off x="2597151" y="4019475"/>
+              <a:ext cx="471915" cy="0"/>
+            </a:xfrm>
+            <a:prstGeom prst="line">
+              <a:avLst/>
+            </a:prstGeom>
+            <a:ln w="38100" cmpd="sng">
+              <a:solidFill>
+                <a:schemeClr val="tx1"/>
+              </a:solidFill>
+            </a:ln>
+            <a:effectLst/>
+          </p:spPr>
+          <p:style>
+            <a:lnRef idx="2">
+              <a:schemeClr val="accent1"/>
+            </a:lnRef>
+            <a:fillRef idx="0">
+              <a:schemeClr val="accent1"/>
+            </a:fillRef>
+            <a:effectRef idx="1">
+              <a:schemeClr val="accent1"/>
+            </a:effectRef>
+            <a:fontRef idx="minor">
+              <a:schemeClr val="tx1"/>
+            </a:fontRef>
+          </p:style>
+        </p:cxnSp>
+      </p:grpSp>
+      <p:grpSp>
+        <p:nvGrpSpPr>
+          <p:cNvPr id="73" name="Grouper 72"/>
+          <p:cNvGrpSpPr/>
+          <p:nvPr/>
+        </p:nvGrpSpPr>
+        <p:grpSpPr>
+          <a:xfrm>
+            <a:off x="2313374" y="4019474"/>
+            <a:ext cx="344156" cy="257974"/>
+            <a:chOff x="2326074" y="4019474"/>
+            <a:chExt cx="344156" cy="257974"/>
+          </a:xfrm>
+        </p:grpSpPr>
+        <p:cxnSp>
+          <p:nvCxnSpPr>
+            <p:cNvPr id="68" name="Connecteur droit 67"/>
+            <p:cNvCxnSpPr/>
+            <p:nvPr/>
+          </p:nvCxnSpPr>
+          <p:spPr>
+            <a:xfrm flipV="1">
+              <a:off x="2338772" y="4019474"/>
+              <a:ext cx="0" cy="257974"/>
+            </a:xfrm>
+            <a:prstGeom prst="line">
+              <a:avLst/>
+            </a:prstGeom>
+            <a:ln w="76200" cmpd="sng">
+              <a:solidFill>
+                <a:schemeClr val="tx1"/>
+              </a:solidFill>
+            </a:ln>
+            <a:effectLst/>
+          </p:spPr>
+          <p:style>
+            <a:lnRef idx="2">
+              <a:schemeClr val="accent1"/>
+            </a:lnRef>
+            <a:fillRef idx="0">
+              <a:schemeClr val="accent1"/>
+            </a:fillRef>
+            <a:effectRef idx="1">
+              <a:schemeClr val="accent1"/>
+            </a:effectRef>
+            <a:fontRef idx="minor">
+              <a:schemeClr val="tx1"/>
+            </a:fontRef>
+          </p:style>
+        </p:cxnSp>
+        <p:cxnSp>
+          <p:nvCxnSpPr>
+            <p:cNvPr id="69" name="Connecteur droit 68"/>
+            <p:cNvCxnSpPr/>
+            <p:nvPr/>
+          </p:nvCxnSpPr>
+          <p:spPr>
+            <a:xfrm flipH="1" flipV="1">
+              <a:off x="2326074" y="4021593"/>
+              <a:ext cx="344156" cy="1"/>
+            </a:xfrm>
+            <a:prstGeom prst="line">
+              <a:avLst/>
+            </a:prstGeom>
+            <a:ln w="38100" cmpd="sng">
+              <a:solidFill>
+                <a:schemeClr val="tx1"/>
+              </a:solidFill>
+            </a:ln>
+            <a:effectLst/>
+          </p:spPr>
+          <p:style>
+            <a:lnRef idx="2">
+              <a:schemeClr val="accent1"/>
+            </a:lnRef>
+            <a:fillRef idx="0">
+              <a:schemeClr val="accent1"/>
+            </a:fillRef>
+            <a:effectRef idx="1">
+              <a:schemeClr val="accent1"/>
+            </a:effectRef>
+            <a:fontRef idx="minor">
+              <a:schemeClr val="tx1"/>
+            </a:fontRef>
+          </p:style>
+        </p:cxnSp>
+      </p:grpSp>
+      <p:sp>
+        <p:nvSpPr>
+          <p:cNvPr id="76" name="Rectangle 75"/>
+          <p:cNvSpPr/>
+          <p:nvPr/>
+        </p:nvSpPr>
+        <p:spPr>
+          <a:xfrm rot="16200000">
+            <a:off x="3568175" y="3915354"/>
+            <a:ext cx="141569" cy="1509891"/>
+          </a:xfrm>
+          <a:prstGeom prst="rect">
+            <a:avLst/>
+          </a:prstGeom>
+          <a:noFill/>
+          <a:ln w="3175" cmpd="sng">
+            <a:solidFill>
+              <a:schemeClr val="tx1"/>
+            </a:solidFill>
+          </a:ln>
+          <a:effectLst/>
+        </p:spPr>
+        <p:style>
+          <a:lnRef idx="1">
+            <a:schemeClr val="accent1"/>
+          </a:lnRef>
+          <a:fillRef idx="3">
+            <a:schemeClr val="accent1"/>
+          </a:fillRef>
+          <a:effectRef idx="2">
+            <a:schemeClr val="accent1"/>
+          </a:effectRef>
+          <a:fontRef idx="minor">
+            <a:schemeClr val="lt1"/>
+          </a:fontRef>
+        </p:style>
+        <p:txBody>
+          <a:bodyPr rtlCol="0" anchor="ctr"/>
+          <a:lstStyle/>
+          <a:p>
+            <a:pPr algn="ctr"/>
+            <a:endParaRPr lang="fr-FR"/>
+          </a:p>
+        </p:txBody>
+      </p:sp>
+      <p:sp>
+        <p:nvSpPr>
+          <p:cNvPr id="77" name="Rectangle 76"/>
+          <p:cNvSpPr/>
+          <p:nvPr/>
+        </p:nvSpPr>
+        <p:spPr>
+          <a:xfrm rot="10800000">
+            <a:off x="2796240" y="5683249"/>
+            <a:ext cx="135470" cy="704718"/>
+          </a:xfrm>
+          <a:prstGeom prst="rect">
+            <a:avLst/>
+          </a:prstGeom>
+          <a:noFill/>
+          <a:ln w="3175" cmpd="sng">
+            <a:solidFill>
+              <a:schemeClr val="tx1"/>
+            </a:solidFill>
+          </a:ln>
+          <a:effectLst/>
+        </p:spPr>
+        <p:style>
+          <a:lnRef idx="1">
+            <a:schemeClr val="accent1"/>
+          </a:lnRef>
+          <a:fillRef idx="3">
+            <a:schemeClr val="accent1"/>
+          </a:fillRef>
+          <a:effectRef idx="2">
+            <a:schemeClr val="accent1"/>
+          </a:effectRef>
+          <a:fontRef idx="minor">
+            <a:schemeClr val="lt1"/>
+          </a:fontRef>
+        </p:style>
+        <p:txBody>
+          <a:bodyPr rtlCol="0" anchor="ctr"/>
+          <a:lstStyle/>
+          <a:p>
+            <a:pPr algn="ctr"/>
+            <a:endParaRPr lang="fr-FR"/>
+          </a:p>
+        </p:txBody>
+      </p:sp>
+      <p:sp>
+        <p:nvSpPr>
+          <p:cNvPr id="78" name="Rectangle 77"/>
+          <p:cNvSpPr/>
+          <p:nvPr/>
+        </p:nvSpPr>
+        <p:spPr>
+          <a:xfrm rot="10800000">
+            <a:off x="3180919" y="5683249"/>
+            <a:ext cx="135470" cy="704718"/>
+          </a:xfrm>
+          <a:prstGeom prst="rect">
+            <a:avLst/>
+          </a:prstGeom>
+          <a:noFill/>
+          <a:ln w="3175" cmpd="sng">
+            <a:solidFill>
+              <a:schemeClr val="tx1"/>
+            </a:solidFill>
+          </a:ln>
+          <a:effectLst/>
+        </p:spPr>
+        <p:style>
+          <a:lnRef idx="1">
+            <a:schemeClr val="accent1"/>
+          </a:lnRef>
+          <a:fillRef idx="3">
+            <a:schemeClr val="accent1"/>
+          </a:fillRef>
+          <a:effectRef idx="2">
+            <a:schemeClr val="accent1"/>
+          </a:effectRef>
+          <a:fontRef idx="minor">
+            <a:schemeClr val="lt1"/>
+          </a:fontRef>
+        </p:style>
+        <p:txBody>
+          <a:bodyPr rtlCol="0" anchor="ctr"/>
+          <a:lstStyle/>
+          <a:p>
+            <a:pPr algn="ctr"/>
+            <a:endParaRPr lang="fr-FR"/>
+          </a:p>
+        </p:txBody>
+      </p:sp>
+      <p:sp>
+        <p:nvSpPr>
+          <p:cNvPr id="79" name="Rectangle 78"/>
+          <p:cNvSpPr/>
+          <p:nvPr/>
+        </p:nvSpPr>
+        <p:spPr>
+          <a:xfrm rot="10800000">
+            <a:off x="3565598" y="5683249"/>
+            <a:ext cx="135470" cy="704718"/>
+          </a:xfrm>
+          <a:prstGeom prst="rect">
+            <a:avLst/>
+          </a:prstGeom>
+          <a:noFill/>
+          <a:ln w="3175" cmpd="sng">
+            <a:solidFill>
+              <a:schemeClr val="tx1"/>
+            </a:solidFill>
+          </a:ln>
+          <a:effectLst/>
+        </p:spPr>
+        <p:style>
+          <a:lnRef idx="1">
+            <a:schemeClr val="accent1"/>
+          </a:lnRef>
+          <a:fillRef idx="3">
+            <a:schemeClr val="accent1"/>
+          </a:fillRef>
+          <a:effectRef idx="2">
+            <a:schemeClr val="accent1"/>
+          </a:effectRef>
+          <a:fontRef idx="minor">
+            <a:schemeClr val="lt1"/>
+          </a:fontRef>
+        </p:style>
+        <p:txBody>
+          <a:bodyPr rtlCol="0" anchor="ctr"/>
+          <a:lstStyle/>
+          <a:p>
+            <a:pPr algn="ctr"/>
+            <a:endParaRPr lang="fr-FR"/>
+          </a:p>
+        </p:txBody>
+      </p:sp>
+      <p:sp>
+        <p:nvSpPr>
+          <p:cNvPr id="80" name="Rectangle 79"/>
+          <p:cNvSpPr/>
+          <p:nvPr/>
+        </p:nvSpPr>
+        <p:spPr>
+          <a:xfrm rot="10800000">
+            <a:off x="3950277" y="5683249"/>
+            <a:ext cx="135470" cy="704718"/>
+          </a:xfrm>
+          <a:prstGeom prst="rect">
+            <a:avLst/>
+          </a:prstGeom>
+          <a:noFill/>
+          <a:ln w="3175" cmpd="sng">
+            <a:solidFill>
+              <a:schemeClr val="tx1"/>
+            </a:solidFill>
+          </a:ln>
+          <a:effectLst/>
+        </p:spPr>
+        <p:style>
+          <a:lnRef idx="1">
+            <a:schemeClr val="accent1"/>
+          </a:lnRef>
+          <a:fillRef idx="3">
+            <a:schemeClr val="accent1"/>
+          </a:fillRef>
+          <a:effectRef idx="2">
+            <a:schemeClr val="accent1"/>
+          </a:effectRef>
+          <a:fontRef idx="minor">
+            <a:schemeClr val="lt1"/>
+          </a:fontRef>
+        </p:style>
+        <p:txBody>
+          <a:bodyPr rtlCol="0" anchor="ctr"/>
+          <a:lstStyle/>
+          <a:p>
+            <a:pPr algn="ctr"/>
+            <a:endParaRPr lang="fr-FR"/>
+          </a:p>
+        </p:txBody>
+      </p:sp>
+      <p:sp>
+        <p:nvSpPr>
+          <p:cNvPr id="81" name="Rectangle 80"/>
+          <p:cNvSpPr/>
+          <p:nvPr/>
+        </p:nvSpPr>
+        <p:spPr>
+          <a:xfrm rot="10800000">
+            <a:off x="4334956" y="5683250"/>
+            <a:ext cx="135470" cy="704718"/>
+          </a:xfrm>
+          <a:prstGeom prst="rect">
+            <a:avLst/>
+          </a:prstGeom>
+          <a:noFill/>
+          <a:ln w="3175" cmpd="sng">
+            <a:solidFill>
+              <a:schemeClr val="tx1"/>
+            </a:solidFill>
+          </a:ln>
+          <a:effectLst/>
+        </p:spPr>
+        <p:style>
+          <a:lnRef idx="1">
+            <a:schemeClr val="accent1"/>
+          </a:lnRef>
+          <a:fillRef idx="3">
+            <a:schemeClr val="accent1"/>
+          </a:fillRef>
+          <a:effectRef idx="2">
+            <a:schemeClr val="accent1"/>
+          </a:effectRef>
+          <a:fontRef idx="minor">
+            <a:schemeClr val="lt1"/>
+          </a:fontRef>
+        </p:style>
+        <p:txBody>
+          <a:bodyPr rtlCol="0" anchor="ctr"/>
+          <a:lstStyle/>
+          <a:p>
+            <a:pPr algn="ctr"/>
+            <a:endParaRPr lang="fr-FR"/>
+          </a:p>
+        </p:txBody>
+      </p:sp>
+      <p:sp>
+        <p:nvSpPr>
+          <p:cNvPr id="82" name="Rectangle 81"/>
+          <p:cNvSpPr/>
+          <p:nvPr/>
+        </p:nvSpPr>
+        <p:spPr>
+          <a:xfrm rot="10800000">
+            <a:off x="4719635" y="6032499"/>
+            <a:ext cx="135470" cy="355469"/>
+          </a:xfrm>
+          <a:prstGeom prst="rect">
+            <a:avLst/>
+          </a:prstGeom>
+          <a:noFill/>
+          <a:ln w="3175" cmpd="sng">
+            <a:solidFill>
+              <a:schemeClr val="tx1"/>
+            </a:solidFill>
+          </a:ln>
+          <a:effectLst/>
+        </p:spPr>
+        <p:style>
+          <a:lnRef idx="1">
+            <a:schemeClr val="accent1"/>
+          </a:lnRef>
+          <a:fillRef idx="3">
+            <a:schemeClr val="accent1"/>
+          </a:fillRef>
+          <a:effectRef idx="2">
+            <a:schemeClr val="accent1"/>
+          </a:effectRef>
+          <a:fontRef idx="minor">
+            <a:schemeClr val="lt1"/>
+          </a:fontRef>
+        </p:style>
+        <p:txBody>
+          <a:bodyPr rtlCol="0" anchor="ctr"/>
+          <a:lstStyle/>
+          <a:p>
+            <a:pPr algn="ctr"/>
+            <a:endParaRPr lang="fr-FR"/>
+          </a:p>
+        </p:txBody>
+      </p:sp>
+      <p:sp>
+        <p:nvSpPr>
+          <p:cNvPr id="83" name="Rectangle 82"/>
+          <p:cNvSpPr/>
+          <p:nvPr/>
+        </p:nvSpPr>
+        <p:spPr>
+          <a:xfrm rot="10800000">
+            <a:off x="5104314" y="5683252"/>
+            <a:ext cx="135470" cy="704718"/>
+          </a:xfrm>
+          <a:prstGeom prst="rect">
+            <a:avLst/>
+          </a:prstGeom>
+          <a:noFill/>
+          <a:ln w="3175" cmpd="sng">
+            <a:solidFill>
+              <a:schemeClr val="tx1"/>
+            </a:solidFill>
+          </a:ln>
+          <a:effectLst/>
+        </p:spPr>
+        <p:style>
+          <a:lnRef idx="1">
+            <a:schemeClr val="accent1"/>
+          </a:lnRef>
+          <a:fillRef idx="3">
+            <a:schemeClr val="accent1"/>
+          </a:fillRef>
+          <a:effectRef idx="2">
+            <a:schemeClr val="accent1"/>
+          </a:effectRef>
+          <a:fontRef idx="minor">
+            <a:schemeClr val="lt1"/>
+          </a:fontRef>
+        </p:style>
+        <p:txBody>
+          <a:bodyPr rtlCol="0" anchor="ctr"/>
+          <a:lstStyle/>
+          <a:p>
+            <a:pPr algn="ctr"/>
+            <a:endParaRPr lang="fr-FR"/>
+          </a:p>
+        </p:txBody>
+      </p:sp>
+      <p:sp>
+        <p:nvSpPr>
+          <p:cNvPr id="84" name="Rectangle 83"/>
+          <p:cNvSpPr/>
+          <p:nvPr/>
+        </p:nvSpPr>
+        <p:spPr>
+          <a:xfrm rot="10800000">
+            <a:off x="5873672" y="5683253"/>
+            <a:ext cx="135470" cy="704718"/>
+          </a:xfrm>
+          <a:prstGeom prst="rect">
+            <a:avLst/>
+          </a:prstGeom>
+          <a:noFill/>
+          <a:ln w="3175" cmpd="sng">
+            <a:solidFill>
+              <a:schemeClr val="tx1"/>
+            </a:solidFill>
+          </a:ln>
+          <a:effectLst/>
+        </p:spPr>
+        <p:style>
+          <a:lnRef idx="1">
+            <a:schemeClr val="accent1"/>
+          </a:lnRef>
+          <a:fillRef idx="3">
+            <a:schemeClr val="accent1"/>
+          </a:fillRef>
+          <a:effectRef idx="2">
+            <a:schemeClr val="accent1"/>
+          </a:effectRef>
+          <a:fontRef idx="minor">
+            <a:schemeClr val="lt1"/>
+          </a:fontRef>
+        </p:style>
+        <p:txBody>
+          <a:bodyPr rtlCol="0" anchor="ctr"/>
+          <a:lstStyle/>
+          <a:p>
+            <a:pPr algn="ctr"/>
+            <a:endParaRPr lang="fr-FR"/>
+          </a:p>
+        </p:txBody>
+      </p:sp>
+      <p:sp>
+        <p:nvSpPr>
+          <p:cNvPr id="85" name="Rectangle 84"/>
+          <p:cNvSpPr/>
+          <p:nvPr/>
+        </p:nvSpPr>
+        <p:spPr>
+          <a:xfrm rot="10800000">
+            <a:off x="6643030" y="5683254"/>
+            <a:ext cx="135470" cy="704718"/>
+          </a:xfrm>
+          <a:prstGeom prst="rect">
+            <a:avLst/>
+          </a:prstGeom>
+          <a:noFill/>
+          <a:ln w="3175" cmpd="sng">
+            <a:solidFill>
+              <a:schemeClr val="tx1"/>
+            </a:solidFill>
+          </a:ln>
+          <a:effectLst/>
+        </p:spPr>
+        <p:style>
+          <a:lnRef idx="1">
+            <a:schemeClr val="accent1"/>
+          </a:lnRef>
+          <a:fillRef idx="3">
+            <a:schemeClr val="accent1"/>
+          </a:fillRef>
+          <a:effectRef idx="2">
+            <a:schemeClr val="accent1"/>
+          </a:effectRef>
+          <a:fontRef idx="minor">
+            <a:schemeClr val="lt1"/>
+          </a:fontRef>
+        </p:style>
+        <p:txBody>
+          <a:bodyPr rtlCol="0" anchor="ctr"/>
+          <a:lstStyle/>
+          <a:p>
+            <a:pPr algn="ctr"/>
+            <a:endParaRPr lang="fr-FR"/>
+          </a:p>
+        </p:txBody>
+      </p:sp>
+      <p:sp>
+        <p:nvSpPr>
+          <p:cNvPr id="75" name="Arc plein 74"/>
+          <p:cNvSpPr/>
+          <p:nvPr/>
+        </p:nvSpPr>
+        <p:spPr>
+          <a:xfrm>
+            <a:off x="3073400" y="4883149"/>
+            <a:ext cx="952870" cy="863601"/>
+          </a:xfrm>
+          <a:prstGeom prst="blockArc">
+            <a:avLst>
+              <a:gd name="adj1" fmla="val 11015887"/>
+              <a:gd name="adj2" fmla="val 16235504"/>
+              <a:gd name="adj3" fmla="val 15994"/>
+            </a:avLst>
+          </a:prstGeom>
+          <a:noFill/>
+          <a:ln>
+            <a:solidFill>
+              <a:srgbClr val="000000"/>
+            </a:solidFill>
+          </a:ln>
+          <a:effectLst/>
+        </p:spPr>
+        <p:style>
+          <a:lnRef idx="1">
+            <a:schemeClr val="accent1"/>
+          </a:lnRef>
+          <a:fillRef idx="3">
+            <a:schemeClr val="accent1"/>
+          </a:fillRef>
+          <a:effectRef idx="2">
+            <a:schemeClr val="accent1"/>
+          </a:effectRef>
+          <a:fontRef idx="minor">
+            <a:schemeClr val="lt1"/>
+          </a:fontRef>
+        </p:style>
+        <p:txBody>
+          <a:bodyPr rtlCol="0" anchor="ctr"/>
+          <a:lstStyle/>
+          <a:p>
+            <a:pPr algn="ctr"/>
+            <a:endParaRPr lang="fr-FR">
+              <a:solidFill>
+                <a:schemeClr val="tx1"/>
+              </a:solidFill>
+            </a:endParaRPr>
+          </a:p>
+        </p:txBody>
+      </p:sp>
+      <p:sp>
+        <p:nvSpPr>
+          <p:cNvPr id="89" name="Arc plein 88"/>
+          <p:cNvSpPr/>
+          <p:nvPr/>
+        </p:nvSpPr>
+        <p:spPr>
+          <a:xfrm flipH="1">
+            <a:off x="3369939" y="4878914"/>
+            <a:ext cx="952870" cy="863601"/>
+          </a:xfrm>
+          <a:prstGeom prst="blockArc">
+            <a:avLst>
+              <a:gd name="adj1" fmla="val 11015887"/>
+              <a:gd name="adj2" fmla="val 16235504"/>
+              <a:gd name="adj3" fmla="val 15994"/>
+            </a:avLst>
+          </a:prstGeom>
+          <a:noFill/>
+          <a:ln>
+            <a:solidFill>
+              <a:srgbClr val="000000"/>
+            </a:solidFill>
+          </a:ln>
+          <a:effectLst/>
+        </p:spPr>
+        <p:style>
+          <a:lnRef idx="1">
+            <a:schemeClr val="accent1"/>
+          </a:lnRef>
+          <a:fillRef idx="3">
+            <a:schemeClr val="accent1"/>
+          </a:fillRef>
+          <a:effectRef idx="2">
+            <a:schemeClr val="accent1"/>
+          </a:effectRef>
+          <a:fontRef idx="minor">
+            <a:schemeClr val="lt1"/>
+          </a:fontRef>
+        </p:style>
+        <p:txBody>
+          <a:bodyPr rtlCol="0" anchor="ctr"/>
+          <a:lstStyle/>
+          <a:p>
+            <a:pPr algn="ctr"/>
+            <a:endParaRPr lang="fr-FR">
+              <a:solidFill>
+                <a:schemeClr val="tx1"/>
+              </a:solidFill>
+            </a:endParaRPr>
+          </a:p>
+        </p:txBody>
+      </p:sp>
+      <p:sp>
+        <p:nvSpPr>
+          <p:cNvPr id="90" name="Arc plein 89"/>
+          <p:cNvSpPr/>
+          <p:nvPr/>
+        </p:nvSpPr>
+        <p:spPr>
+          <a:xfrm>
+            <a:off x="4948404" y="4883149"/>
+            <a:ext cx="952870" cy="863601"/>
+          </a:xfrm>
+          <a:prstGeom prst="blockArc">
+            <a:avLst>
+              <a:gd name="adj1" fmla="val 11015887"/>
+              <a:gd name="adj2" fmla="val 16235504"/>
+              <a:gd name="adj3" fmla="val 15994"/>
+            </a:avLst>
+          </a:prstGeom>
+          <a:noFill/>
+          <a:ln>
+            <a:solidFill>
+              <a:srgbClr val="000000"/>
+            </a:solidFill>
+          </a:ln>
+          <a:effectLst/>
+        </p:spPr>
+        <p:style>
+          <a:lnRef idx="1">
+            <a:schemeClr val="accent1"/>
+          </a:lnRef>
+          <a:fillRef idx="3">
+            <a:schemeClr val="accent1"/>
+          </a:fillRef>
+          <a:effectRef idx="2">
+            <a:schemeClr val="accent1"/>
+          </a:effectRef>
+          <a:fontRef idx="minor">
+            <a:schemeClr val="lt1"/>
+          </a:fontRef>
+        </p:style>
+        <p:txBody>
+          <a:bodyPr rtlCol="0" anchor="ctr"/>
+          <a:lstStyle/>
+          <a:p>
+            <a:pPr algn="ctr"/>
+            <a:endParaRPr lang="fr-FR">
+              <a:solidFill>
+                <a:schemeClr val="tx1"/>
+              </a:solidFill>
+            </a:endParaRPr>
+          </a:p>
+        </p:txBody>
+      </p:sp>
+      <p:sp>
+        <p:nvSpPr>
+          <p:cNvPr id="91" name="Arc plein 90"/>
+          <p:cNvSpPr/>
+          <p:nvPr/>
+        </p:nvSpPr>
+        <p:spPr>
+          <a:xfrm flipH="1">
+            <a:off x="5244943" y="4878914"/>
+            <a:ext cx="952870" cy="863601"/>
+          </a:xfrm>
+          <a:prstGeom prst="blockArc">
+            <a:avLst>
+              <a:gd name="adj1" fmla="val 11015887"/>
+              <a:gd name="adj2" fmla="val 16235504"/>
+              <a:gd name="adj3" fmla="val 15994"/>
+            </a:avLst>
+          </a:prstGeom>
+          <a:noFill/>
+          <a:ln>
+            <a:solidFill>
+              <a:srgbClr val="000000"/>
+            </a:solidFill>
+          </a:ln>
+          <a:effectLst/>
+        </p:spPr>
+        <p:style>
+          <a:lnRef idx="1">
+            <a:schemeClr val="accent1"/>
+          </a:lnRef>
+          <a:fillRef idx="3">
+            <a:schemeClr val="accent1"/>
+          </a:fillRef>
+          <a:effectRef idx="2">
+            <a:schemeClr val="accent1"/>
+          </a:effectRef>
+          <a:fontRef idx="minor">
+            <a:schemeClr val="lt1"/>
+          </a:fontRef>
+        </p:style>
+        <p:txBody>
+          <a:bodyPr rtlCol="0" anchor="ctr"/>
+          <a:lstStyle/>
+          <a:p>
+            <a:pPr algn="ctr"/>
+            <a:endParaRPr lang="fr-FR">
+              <a:solidFill>
+                <a:schemeClr val="tx1"/>
+              </a:solidFill>
+            </a:endParaRPr>
+          </a:p>
+        </p:txBody>
+      </p:sp>
+      <p:sp>
+        <p:nvSpPr>
+          <p:cNvPr id="92" name="Rectangle 91"/>
+          <p:cNvSpPr/>
+          <p:nvPr/>
+        </p:nvSpPr>
+        <p:spPr>
+          <a:xfrm rot="16200000">
+            <a:off x="5370091" y="3922928"/>
+            <a:ext cx="141568" cy="1494743"/>
+          </a:xfrm>
+          <a:prstGeom prst="rect">
+            <a:avLst/>
+          </a:prstGeom>
+          <a:noFill/>
+          <a:ln w="3175" cmpd="sng">
+            <a:solidFill>
+              <a:schemeClr val="tx1"/>
+            </a:solidFill>
+          </a:ln>
+          <a:effectLst/>
+        </p:spPr>
+        <p:style>
+          <a:lnRef idx="1">
+            <a:schemeClr val="accent1"/>
+          </a:lnRef>
+          <a:fillRef idx="3">
+            <a:schemeClr val="accent1"/>
+          </a:fillRef>
+          <a:effectRef idx="2">
+            <a:schemeClr val="accent1"/>
+          </a:effectRef>
+          <a:fontRef idx="minor">
+            <a:schemeClr val="lt1"/>
+          </a:fontRef>
+        </p:style>
+        <p:txBody>
+          <a:bodyPr rtlCol="0" anchor="ctr"/>
+          <a:lstStyle/>
+          <a:p>
+            <a:pPr algn="ctr"/>
+            <a:endParaRPr lang="fr-FR"/>
+          </a:p>
+        </p:txBody>
+      </p:sp>
+      <p:sp>
+        <p:nvSpPr>
+          <p:cNvPr id="93" name="Rectangle 92"/>
+          <p:cNvSpPr/>
+          <p:nvPr/>
+        </p:nvSpPr>
+        <p:spPr>
+          <a:xfrm rot="10800000">
+            <a:off x="4517820" y="916637"/>
+            <a:ext cx="135468" cy="342010"/>
+          </a:xfrm>
+          <a:prstGeom prst="rect">
+            <a:avLst/>
+          </a:prstGeom>
+          <a:noFill/>
+          <a:ln w="3175" cmpd="sng">
+            <a:solidFill>
+              <a:schemeClr val="tx1"/>
+            </a:solidFill>
+          </a:ln>
+          <a:effectLst/>
+        </p:spPr>
+        <p:style>
+          <a:lnRef idx="1">
+            <a:schemeClr val="accent1"/>
+          </a:lnRef>
+          <a:fillRef idx="3">
+            <a:schemeClr val="accent1"/>
+          </a:fillRef>
+          <a:effectRef idx="2">
+            <a:schemeClr val="accent1"/>
+          </a:effectRef>
+          <a:fontRef idx="minor">
+            <a:schemeClr val="lt1"/>
+          </a:fontRef>
+        </p:style>
+        <p:txBody>
+          <a:bodyPr rtlCol="0" anchor="ctr"/>
+          <a:lstStyle/>
+          <a:p>
+            <a:pPr algn="ctr"/>
+            <a:endParaRPr lang="fr-FR"/>
+          </a:p>
+        </p:txBody>
+      </p:sp>
+      <p:sp>
+        <p:nvSpPr>
+          <p:cNvPr id="94" name="Rectangle 93"/>
+          <p:cNvSpPr/>
+          <p:nvPr/>
+        </p:nvSpPr>
+        <p:spPr>
+          <a:xfrm rot="10800000">
+            <a:off x="4131833" y="1365250"/>
+            <a:ext cx="135468" cy="296213"/>
+          </a:xfrm>
+          <a:prstGeom prst="rect">
+            <a:avLst/>
+          </a:prstGeom>
+          <a:noFill/>
+          <a:ln w="3175" cmpd="sng">
+            <a:solidFill>
+              <a:schemeClr val="tx1"/>
+            </a:solidFill>
+          </a:ln>
+          <a:effectLst/>
+        </p:spPr>
+        <p:style>
+          <a:lnRef idx="1">
+            <a:schemeClr val="accent1"/>
+          </a:lnRef>
+          <a:fillRef idx="3">
+            <a:schemeClr val="accent1"/>
+          </a:fillRef>
+          <a:effectRef idx="2">
+            <a:schemeClr val="accent1"/>
+          </a:effectRef>
+          <a:fontRef idx="minor">
+            <a:schemeClr val="lt1"/>
+          </a:fontRef>
+        </p:style>
+        <p:txBody>
+          <a:bodyPr rtlCol="0" anchor="ctr"/>
+          <a:lstStyle/>
+          <a:p>
+            <a:pPr algn="ctr"/>
+            <a:endParaRPr lang="fr-FR"/>
+          </a:p>
+        </p:txBody>
+      </p:sp>
+      <p:sp>
+        <p:nvSpPr>
+          <p:cNvPr id="95" name="Rectangle 94"/>
+          <p:cNvSpPr/>
+          <p:nvPr/>
+        </p:nvSpPr>
+        <p:spPr>
+          <a:xfrm rot="10800000">
+            <a:off x="3747826" y="910287"/>
+            <a:ext cx="135468" cy="296213"/>
+          </a:xfrm>
+          <a:prstGeom prst="rect">
+            <a:avLst/>
+          </a:prstGeom>
+          <a:noFill/>
+          <a:ln w="3175" cmpd="sng">
+            <a:solidFill>
+              <a:schemeClr val="tx1"/>
+            </a:solidFill>
+          </a:ln>
+          <a:effectLst/>
+        </p:spPr>
+        <p:style>
+          <a:lnRef idx="1">
+            <a:schemeClr val="accent1"/>
+          </a:lnRef>
+          <a:fillRef idx="3">
+            <a:schemeClr val="accent1"/>
+          </a:fillRef>
+          <a:effectRef idx="2">
+            <a:schemeClr val="accent1"/>
+          </a:effectRef>
+          <a:fontRef idx="minor">
+            <a:schemeClr val="lt1"/>
+          </a:fontRef>
+        </p:style>
+        <p:txBody>
+          <a:bodyPr rtlCol="0" anchor="ctr"/>
+          <a:lstStyle/>
+          <a:p>
+            <a:pPr algn="ctr"/>
+            <a:endParaRPr lang="fr-FR"/>
+          </a:p>
+        </p:txBody>
+      </p:sp>
+      <p:sp>
+        <p:nvSpPr>
+          <p:cNvPr id="96" name="Rectangle 95"/>
+          <p:cNvSpPr/>
+          <p:nvPr/>
+        </p:nvSpPr>
+        <p:spPr>
+          <a:xfrm rot="10800000">
+            <a:off x="3747826" y="1365250"/>
+            <a:ext cx="135468" cy="296213"/>
+          </a:xfrm>
+          <a:prstGeom prst="rect">
+            <a:avLst/>
+          </a:prstGeom>
+          <a:noFill/>
+          <a:ln w="3175" cmpd="sng">
+            <a:solidFill>
+              <a:schemeClr val="tx1"/>
+            </a:solidFill>
+          </a:ln>
+          <a:effectLst/>
+        </p:spPr>
+        <p:style>
+          <a:lnRef idx="1">
+            <a:schemeClr val="accent1"/>
+          </a:lnRef>
+          <a:fillRef idx="3">
+            <a:schemeClr val="accent1"/>
+          </a:fillRef>
+          <a:effectRef idx="2">
+            <a:schemeClr val="accent1"/>
+          </a:effectRef>
+          <a:fontRef idx="minor">
+            <a:schemeClr val="lt1"/>
+          </a:fontRef>
+        </p:style>
+        <p:txBody>
+          <a:bodyPr rtlCol="0" anchor="ctr"/>
+          <a:lstStyle/>
+          <a:p>
+            <a:pPr algn="ctr"/>
+            <a:endParaRPr lang="fr-FR"/>
+          </a:p>
+        </p:txBody>
+      </p:sp>
+      <p:sp>
+        <p:nvSpPr>
+          <p:cNvPr id="97" name="Rectangle 96"/>
+          <p:cNvSpPr/>
+          <p:nvPr/>
+        </p:nvSpPr>
+        <p:spPr>
+          <a:xfrm rot="10800000">
+            <a:off x="3363820" y="910287"/>
+            <a:ext cx="135468" cy="296213"/>
+          </a:xfrm>
+          <a:prstGeom prst="rect">
+            <a:avLst/>
+          </a:prstGeom>
+          <a:noFill/>
+          <a:ln w="3175" cmpd="sng">
+            <a:solidFill>
+              <a:schemeClr val="tx1"/>
+            </a:solidFill>
+          </a:ln>
+          <a:effectLst/>
+        </p:spPr>
+        <p:style>
+          <a:lnRef idx="1">
+            <a:schemeClr val="accent1"/>
+          </a:lnRef>
+          <a:fillRef idx="3">
+            <a:schemeClr val="accent1"/>
+          </a:fillRef>
+          <a:effectRef idx="2">
+            <a:schemeClr val="accent1"/>
+          </a:effectRef>
+          <a:fontRef idx="minor">
+            <a:schemeClr val="lt1"/>
+          </a:fontRef>
+        </p:style>
+        <p:txBody>
+          <a:bodyPr rtlCol="0" anchor="ctr"/>
+          <a:lstStyle/>
+          <a:p>
+            <a:pPr algn="ctr"/>
+            <a:endParaRPr lang="fr-FR"/>
+          </a:p>
+        </p:txBody>
+      </p:sp>
+      <p:sp>
+        <p:nvSpPr>
+          <p:cNvPr id="98" name="Rectangle 97"/>
+          <p:cNvSpPr/>
+          <p:nvPr/>
+        </p:nvSpPr>
+        <p:spPr>
+          <a:xfrm rot="10800000">
+            <a:off x="3363820" y="1365250"/>
+            <a:ext cx="135468" cy="296213"/>
+          </a:xfrm>
+          <a:prstGeom prst="rect">
+            <a:avLst/>
+          </a:prstGeom>
+          <a:noFill/>
+          <a:ln w="3175" cmpd="sng">
+            <a:solidFill>
+              <a:schemeClr val="tx1"/>
+            </a:solidFill>
+          </a:ln>
+          <a:effectLst/>
+        </p:spPr>
+        <p:style>
+          <a:lnRef idx="1">
+            <a:schemeClr val="accent1"/>
+          </a:lnRef>
+          <a:fillRef idx="3">
+            <a:schemeClr val="accent1"/>
+          </a:fillRef>
+          <a:effectRef idx="2">
+            <a:schemeClr val="accent1"/>
+          </a:effectRef>
+          <a:fontRef idx="minor">
+            <a:schemeClr val="lt1"/>
+          </a:fontRef>
+        </p:style>
+        <p:txBody>
+          <a:bodyPr rtlCol="0" anchor="ctr"/>
+          <a:lstStyle/>
+          <a:p>
+            <a:pPr algn="ctr"/>
+            <a:endParaRPr lang="fr-FR"/>
+          </a:p>
+        </p:txBody>
+      </p:sp>
+      <p:sp>
+        <p:nvSpPr>
+          <p:cNvPr id="99" name="Rectangle 98"/>
+          <p:cNvSpPr/>
+          <p:nvPr/>
+        </p:nvSpPr>
+        <p:spPr>
+          <a:xfrm rot="10800000">
+            <a:off x="2979814" y="910287"/>
+            <a:ext cx="135468" cy="296213"/>
+          </a:xfrm>
+          <a:prstGeom prst="rect">
+            <a:avLst/>
+          </a:prstGeom>
+          <a:noFill/>
+          <a:ln w="3175" cmpd="sng">
+            <a:solidFill>
+              <a:schemeClr val="tx1"/>
+            </a:solidFill>
+          </a:ln>
+          <a:effectLst/>
+        </p:spPr>
+        <p:style>
+          <a:lnRef idx="1">
+            <a:schemeClr val="accent1"/>
+          </a:lnRef>
+          <a:fillRef idx="3">
+            <a:schemeClr val="accent1"/>
+          </a:fillRef>
+          <a:effectRef idx="2">
+            <a:schemeClr val="accent1"/>
+          </a:effectRef>
+          <a:fontRef idx="minor">
+            <a:schemeClr val="lt1"/>
+          </a:fontRef>
+        </p:style>
+        <p:txBody>
+          <a:bodyPr rtlCol="0" anchor="ctr"/>
+          <a:lstStyle/>
+          <a:p>
+            <a:pPr algn="ctr"/>
+            <a:endParaRPr lang="fr-FR"/>
+          </a:p>
+        </p:txBody>
+      </p:sp>
+      <p:sp>
+        <p:nvSpPr>
+          <p:cNvPr id="100" name="Rectangle 99"/>
+          <p:cNvSpPr/>
+          <p:nvPr/>
+        </p:nvSpPr>
+        <p:spPr>
+          <a:xfrm rot="10800000">
+            <a:off x="2979814" y="1365250"/>
+            <a:ext cx="135468" cy="296213"/>
+          </a:xfrm>
+          <a:prstGeom prst="rect">
+            <a:avLst/>
+          </a:prstGeom>
+          <a:noFill/>
+          <a:ln w="3175" cmpd="sng">
+            <a:solidFill>
+              <a:schemeClr val="tx1"/>
+            </a:solidFill>
+          </a:ln>
+          <a:effectLst/>
+        </p:spPr>
+        <p:style>
+          <a:lnRef idx="1">
+            <a:schemeClr val="accent1"/>
+          </a:lnRef>
+          <a:fillRef idx="3">
+            <a:schemeClr val="accent1"/>
+          </a:fillRef>
+          <a:effectRef idx="2">
+            <a:schemeClr val="accent1"/>
+          </a:effectRef>
+          <a:fontRef idx="minor">
+            <a:schemeClr val="lt1"/>
+          </a:fontRef>
+        </p:style>
+        <p:txBody>
+          <a:bodyPr rtlCol="0" anchor="ctr"/>
+          <a:lstStyle/>
+          <a:p>
+            <a:pPr algn="ctr"/>
+            <a:endParaRPr lang="fr-FR"/>
+          </a:p>
+        </p:txBody>
+      </p:sp>
+      <p:sp>
+        <p:nvSpPr>
+          <p:cNvPr id="101" name="Rectangle 100"/>
+          <p:cNvSpPr/>
+          <p:nvPr/>
+        </p:nvSpPr>
+        <p:spPr>
+          <a:xfrm rot="10800000">
+            <a:off x="2595808" y="910287"/>
+            <a:ext cx="135468" cy="296213"/>
+          </a:xfrm>
+          <a:prstGeom prst="rect">
+            <a:avLst/>
+          </a:prstGeom>
+          <a:noFill/>
+          <a:ln w="3175" cmpd="sng">
+            <a:solidFill>
+              <a:schemeClr val="tx1"/>
+            </a:solidFill>
+          </a:ln>
+          <a:effectLst/>
+        </p:spPr>
+        <p:style>
+          <a:lnRef idx="1">
+            <a:schemeClr val="accent1"/>
+          </a:lnRef>
+          <a:fillRef idx="3">
+            <a:schemeClr val="accent1"/>
+          </a:fillRef>
+          <a:effectRef idx="2">
+            <a:schemeClr val="accent1"/>
+          </a:effectRef>
+          <a:fontRef idx="minor">
+            <a:schemeClr val="lt1"/>
+          </a:fontRef>
+        </p:style>
+        <p:txBody>
+          <a:bodyPr rtlCol="0" anchor="ctr"/>
+          <a:lstStyle/>
+          <a:p>
+            <a:pPr algn="ctr"/>
+            <a:endParaRPr lang="fr-FR"/>
+          </a:p>
+        </p:txBody>
+      </p:sp>
+      <p:sp>
+        <p:nvSpPr>
+          <p:cNvPr id="102" name="Rectangle 101"/>
+          <p:cNvSpPr/>
+          <p:nvPr/>
+        </p:nvSpPr>
+        <p:spPr>
+          <a:xfrm rot="10800000">
+            <a:off x="2595808" y="1365250"/>
+            <a:ext cx="135468" cy="296213"/>
+          </a:xfrm>
+          <a:prstGeom prst="rect">
+            <a:avLst/>
+          </a:prstGeom>
+          <a:noFill/>
+          <a:ln w="3175" cmpd="sng">
+            <a:solidFill>
+              <a:schemeClr val="tx1"/>
+            </a:solidFill>
+          </a:ln>
+          <a:effectLst/>
+        </p:spPr>
+        <p:style>
+          <a:lnRef idx="1">
+            <a:schemeClr val="accent1"/>
+          </a:lnRef>
+          <a:fillRef idx="3">
+            <a:schemeClr val="accent1"/>
+          </a:fillRef>
+          <a:effectRef idx="2">
+            <a:schemeClr val="accent1"/>
+          </a:effectRef>
+          <a:fontRef idx="minor">
+            <a:schemeClr val="lt1"/>
+          </a:fontRef>
+        </p:style>
+        <p:txBody>
+          <a:bodyPr rtlCol="0" anchor="ctr"/>
+          <a:lstStyle/>
+          <a:p>
+            <a:pPr algn="ctr"/>
+            <a:endParaRPr lang="fr-FR"/>
+          </a:p>
+        </p:txBody>
+      </p:sp>
+      <p:sp>
+        <p:nvSpPr>
+          <p:cNvPr id="103" name="Rectangle 102"/>
+          <p:cNvSpPr/>
+          <p:nvPr/>
+        </p:nvSpPr>
+        <p:spPr>
+          <a:xfrm rot="10800000">
+            <a:off x="2211802" y="910287"/>
+            <a:ext cx="135468" cy="296213"/>
+          </a:xfrm>
+          <a:prstGeom prst="rect">
+            <a:avLst/>
+          </a:prstGeom>
+          <a:noFill/>
+          <a:ln w="3175" cmpd="sng">
+            <a:solidFill>
+              <a:schemeClr val="tx1"/>
+            </a:solidFill>
+          </a:ln>
+          <a:effectLst/>
+        </p:spPr>
+        <p:style>
+          <a:lnRef idx="1">
+            <a:schemeClr val="accent1"/>
+          </a:lnRef>
+          <a:fillRef idx="3">
+            <a:schemeClr val="accent1"/>
+          </a:fillRef>
+          <a:effectRef idx="2">
+            <a:schemeClr val="accent1"/>
+          </a:effectRef>
+          <a:fontRef idx="minor">
+            <a:schemeClr val="lt1"/>
+          </a:fontRef>
+        </p:style>
+        <p:txBody>
+          <a:bodyPr rtlCol="0" anchor="ctr"/>
+          <a:lstStyle/>
+          <a:p>
+            <a:pPr algn="ctr"/>
+            <a:endParaRPr lang="fr-FR"/>
+          </a:p>
+        </p:txBody>
+      </p:sp>
+      <p:sp>
+        <p:nvSpPr>
+          <p:cNvPr id="104" name="Rectangle 103"/>
+          <p:cNvSpPr/>
+          <p:nvPr/>
+        </p:nvSpPr>
+        <p:spPr>
+          <a:xfrm rot="10800000">
+            <a:off x="2211802" y="1365250"/>
+            <a:ext cx="135468" cy="296213"/>
+          </a:xfrm>
+          <a:prstGeom prst="rect">
+            <a:avLst/>
+          </a:prstGeom>
+          <a:noFill/>
+          <a:ln w="3175" cmpd="sng">
+            <a:solidFill>
+              <a:schemeClr val="tx1"/>
+            </a:solidFill>
+          </a:ln>
+          <a:effectLst/>
+        </p:spPr>
+        <p:style>
+          <a:lnRef idx="1">
+            <a:schemeClr val="accent1"/>
+          </a:lnRef>
+          <a:fillRef idx="3">
+            <a:schemeClr val="accent1"/>
+          </a:fillRef>
+          <a:effectRef idx="2">
+            <a:schemeClr val="accent1"/>
+          </a:effectRef>
+          <a:fontRef idx="minor">
+            <a:schemeClr val="lt1"/>
+          </a:fontRef>
+        </p:style>
+        <p:txBody>
+          <a:bodyPr rtlCol="0" anchor="ctr"/>
+          <a:lstStyle/>
+          <a:p>
+            <a:pPr algn="ctr"/>
+            <a:endParaRPr lang="fr-FR"/>
+          </a:p>
+        </p:txBody>
+      </p:sp>
+      <p:sp>
+        <p:nvSpPr>
+          <p:cNvPr id="109" name="Rectangle 108"/>
+          <p:cNvSpPr/>
+          <p:nvPr/>
+        </p:nvSpPr>
+        <p:spPr>
+          <a:xfrm rot="16200000">
+            <a:off x="4188878" y="2073647"/>
+            <a:ext cx="135468" cy="272308"/>
+          </a:xfrm>
+          <a:prstGeom prst="rect">
+            <a:avLst/>
+          </a:prstGeom>
+          <a:noFill/>
+          <a:ln w="3175" cmpd="sng">
+            <a:solidFill>
+              <a:schemeClr val="tx1"/>
+            </a:solidFill>
+          </a:ln>
+          <a:effectLst/>
+        </p:spPr>
+        <p:style>
+          <a:lnRef idx="1">
+            <a:schemeClr val="accent1"/>
+          </a:lnRef>
+          <a:fillRef idx="3">
+            <a:schemeClr val="accent1"/>
+          </a:fillRef>
+          <a:effectRef idx="2">
+            <a:schemeClr val="accent1"/>
+          </a:effectRef>
+          <a:fontRef idx="minor">
+            <a:schemeClr val="lt1"/>
+          </a:fontRef>
+        </p:style>
+        <p:txBody>
+          <a:bodyPr rtlCol="0" anchor="ctr"/>
+          <a:lstStyle/>
+          <a:p>
+            <a:pPr algn="ctr"/>
+            <a:endParaRPr lang="fr-FR"/>
+          </a:p>
+        </p:txBody>
+      </p:sp>
+      <p:sp>
+        <p:nvSpPr>
+          <p:cNvPr id="110" name="Rectangle 109"/>
+          <p:cNvSpPr/>
+          <p:nvPr/>
+        </p:nvSpPr>
+        <p:spPr>
+          <a:xfrm rot="16200000">
+            <a:off x="4188878" y="2513913"/>
+            <a:ext cx="135468" cy="272308"/>
+          </a:xfrm>
+          <a:prstGeom prst="rect">
+            <a:avLst/>
+          </a:prstGeom>
+          <a:noFill/>
+          <a:ln w="3175" cmpd="sng">
+            <a:solidFill>
+              <a:schemeClr val="tx1"/>
+            </a:solidFill>
+          </a:ln>
+          <a:effectLst/>
+        </p:spPr>
+        <p:style>
+          <a:lnRef idx="1">
+            <a:schemeClr val="accent1"/>
+          </a:lnRef>
+          <a:fillRef idx="3">
+            <a:schemeClr val="accent1"/>
+          </a:fillRef>
+          <a:effectRef idx="2">
+            <a:schemeClr val="accent1"/>
+          </a:effectRef>
+          <a:fontRef idx="minor">
+            <a:schemeClr val="lt1"/>
+          </a:fontRef>
+        </p:style>
+        <p:txBody>
+          <a:bodyPr rtlCol="0" anchor="ctr"/>
+          <a:lstStyle/>
+          <a:p>
+            <a:pPr algn="ctr"/>
+            <a:endParaRPr lang="fr-FR"/>
+          </a:p>
+        </p:txBody>
+      </p:sp>
+      <p:sp>
+        <p:nvSpPr>
+          <p:cNvPr id="111" name="Rectangle 110"/>
+          <p:cNvSpPr/>
+          <p:nvPr/>
+        </p:nvSpPr>
+        <p:spPr>
+          <a:xfrm rot="16200000">
+            <a:off x="4188878" y="2954179"/>
+            <a:ext cx="135468" cy="272308"/>
+          </a:xfrm>
+          <a:prstGeom prst="rect">
+            <a:avLst/>
+          </a:prstGeom>
+          <a:noFill/>
+          <a:ln w="3175" cmpd="sng">
+            <a:solidFill>
+              <a:schemeClr val="tx1"/>
+            </a:solidFill>
+          </a:ln>
+          <a:effectLst/>
+        </p:spPr>
+        <p:style>
+          <a:lnRef idx="1">
+            <a:schemeClr val="accent1"/>
+          </a:lnRef>
+          <a:fillRef idx="3">
+            <a:schemeClr val="accent1"/>
+          </a:fillRef>
+          <a:effectRef idx="2">
+            <a:schemeClr val="accent1"/>
+          </a:effectRef>
+          <a:fontRef idx="minor">
+            <a:schemeClr val="lt1"/>
+          </a:fontRef>
+        </p:style>
+        <p:txBody>
+          <a:bodyPr rtlCol="0" anchor="ctr"/>
+          <a:lstStyle/>
+          <a:p>
+            <a:pPr algn="ctr"/>
+            <a:endParaRPr lang="fr-FR"/>
+          </a:p>
+        </p:txBody>
+      </p:sp>
+      <p:sp>
+        <p:nvSpPr>
+          <p:cNvPr id="112" name="Rectangle 111"/>
+          <p:cNvSpPr/>
+          <p:nvPr/>
+        </p:nvSpPr>
+        <p:spPr>
+          <a:xfrm rot="16200000">
+            <a:off x="4188878" y="3394444"/>
+            <a:ext cx="135468" cy="272308"/>
+          </a:xfrm>
+          <a:prstGeom prst="rect">
+            <a:avLst/>
+          </a:prstGeom>
+          <a:noFill/>
+          <a:ln w="3175" cmpd="sng">
+            <a:solidFill>
+              <a:schemeClr val="tx1"/>
+            </a:solidFill>
+          </a:ln>
+          <a:effectLst/>
+        </p:spPr>
+        <p:style>
+          <a:lnRef idx="1">
+            <a:schemeClr val="accent1"/>
+          </a:lnRef>
+          <a:fillRef idx="3">
+            <a:schemeClr val="accent1"/>
+          </a:fillRef>
+          <a:effectRef idx="2">
+            <a:schemeClr val="accent1"/>
+          </a:effectRef>
+          <a:fontRef idx="minor">
+            <a:schemeClr val="lt1"/>
+          </a:fontRef>
+        </p:style>
+        <p:txBody>
+          <a:bodyPr rtlCol="0" anchor="ctr"/>
+          <a:lstStyle/>
+          <a:p>
+            <a:pPr algn="ctr"/>
+            <a:endParaRPr lang="fr-FR"/>
+          </a:p>
+        </p:txBody>
+      </p:sp>
+      <p:sp>
+        <p:nvSpPr>
+          <p:cNvPr id="115" name="Rectangle 114"/>
+          <p:cNvSpPr/>
+          <p:nvPr/>
+        </p:nvSpPr>
+        <p:spPr>
+          <a:xfrm rot="10800000">
+            <a:off x="3813387" y="3056470"/>
+            <a:ext cx="135468" cy="383042"/>
+          </a:xfrm>
+          <a:prstGeom prst="rect">
+            <a:avLst/>
+          </a:prstGeom>
+          <a:noFill/>
+          <a:ln w="3175" cmpd="sng">
+            <a:solidFill>
+              <a:schemeClr val="tx1"/>
+            </a:solidFill>
+          </a:ln>
+          <a:effectLst/>
+        </p:spPr>
+        <p:style>
+          <a:lnRef idx="1">
+            <a:schemeClr val="accent1"/>
+          </a:lnRef>
+          <a:fillRef idx="3">
+            <a:schemeClr val="accent1"/>
+          </a:fillRef>
+          <a:effectRef idx="2">
+            <a:schemeClr val="accent1"/>
+          </a:effectRef>
+          <a:fontRef idx="minor">
+            <a:schemeClr val="lt1"/>
+          </a:fontRef>
+        </p:style>
+        <p:txBody>
+          <a:bodyPr rtlCol="0" anchor="ctr"/>
+          <a:lstStyle/>
+          <a:p>
+            <a:pPr algn="ctr"/>
+            <a:endParaRPr lang="fr-FR"/>
+          </a:p>
+        </p:txBody>
+      </p:sp>
+      <p:sp>
+        <p:nvSpPr>
+          <p:cNvPr id="116" name="Rectangle 115"/>
+          <p:cNvSpPr/>
+          <p:nvPr/>
+        </p:nvSpPr>
+        <p:spPr>
+          <a:xfrm rot="10800000">
+            <a:off x="3813387" y="3543300"/>
+            <a:ext cx="135468" cy="211590"/>
+          </a:xfrm>
+          <a:prstGeom prst="rect">
+            <a:avLst/>
+          </a:prstGeom>
+          <a:noFill/>
+          <a:ln w="3175" cmpd="sng">
+            <a:solidFill>
+              <a:schemeClr val="tx1"/>
+            </a:solidFill>
+          </a:ln>
+          <a:effectLst/>
+        </p:spPr>
+        <p:style>
+          <a:lnRef idx="1">
+            <a:schemeClr val="accent1"/>
+          </a:lnRef>
+          <a:fillRef idx="3">
+            <a:schemeClr val="accent1"/>
+          </a:fillRef>
+          <a:effectRef idx="2">
+            <a:schemeClr val="accent1"/>
+          </a:effectRef>
+          <a:fontRef idx="minor">
+            <a:schemeClr val="lt1"/>
+          </a:fontRef>
+        </p:style>
+        <p:txBody>
+          <a:bodyPr rtlCol="0" anchor="ctr"/>
+          <a:lstStyle/>
+          <a:p>
+            <a:pPr algn="ctr"/>
+            <a:endParaRPr lang="fr-FR"/>
+          </a:p>
+        </p:txBody>
+      </p:sp>
+      <p:cxnSp>
+        <p:nvCxnSpPr>
+          <p:cNvPr id="88" name="Connecteur droit 87"/>
+          <p:cNvCxnSpPr/>
+          <p:nvPr/>
+        </p:nvCxnSpPr>
+        <p:spPr>
+          <a:xfrm>
+            <a:off x="3684459" y="1935847"/>
+            <a:ext cx="0" cy="781955"/>
+          </a:xfrm>
+          <a:prstGeom prst="line">
+            <a:avLst/>
+          </a:prstGeom>
+          <a:ln>
+            <a:solidFill>
+              <a:schemeClr val="bg1">
+                <a:lumMod val="50000"/>
+              </a:schemeClr>
+            </a:solidFill>
+          </a:ln>
+          <a:effectLst/>
+        </p:spPr>
+        <p:style>
+          <a:lnRef idx="2">
+            <a:schemeClr val="accent1"/>
+          </a:lnRef>
+          <a:fillRef idx="0">
+            <a:schemeClr val="accent1"/>
+          </a:fillRef>
+          <a:effectRef idx="1">
+            <a:schemeClr val="accent1"/>
+          </a:effectRef>
+          <a:fontRef idx="minor">
+            <a:schemeClr val="tx1"/>
+          </a:fontRef>
+        </p:style>
+      </p:cxnSp>
+      <p:cxnSp>
+        <p:nvCxnSpPr>
+          <p:cNvPr id="120" name="Connecteur droit 119"/>
+          <p:cNvCxnSpPr/>
+          <p:nvPr/>
+        </p:nvCxnSpPr>
+        <p:spPr>
+          <a:xfrm>
+            <a:off x="3684459" y="3035299"/>
+            <a:ext cx="0" cy="732365"/>
+          </a:xfrm>
+          <a:prstGeom prst="line">
+            <a:avLst/>
+          </a:prstGeom>
+          <a:ln>
+            <a:solidFill>
+              <a:schemeClr val="bg1">
+                <a:lumMod val="50000"/>
+              </a:schemeClr>
+            </a:solidFill>
+          </a:ln>
+          <a:effectLst/>
+        </p:spPr>
+        <p:style>
+          <a:lnRef idx="2">
+            <a:schemeClr val="accent1"/>
+          </a:lnRef>
+          <a:fillRef idx="0">
+            <a:schemeClr val="accent1"/>
+          </a:fillRef>
+          <a:effectRef idx="1">
+            <a:schemeClr val="accent1"/>
+          </a:effectRef>
+          <a:fontRef idx="minor">
+            <a:schemeClr val="tx1"/>
+          </a:fontRef>
+        </p:style>
+      </p:cxnSp>
+      <p:sp>
+        <p:nvSpPr>
+          <p:cNvPr id="124" name="Rectangle 123"/>
+          <p:cNvSpPr/>
+          <p:nvPr/>
+        </p:nvSpPr>
+        <p:spPr>
+          <a:xfrm rot="10800000" flipV="1">
+            <a:off x="3813387" y="2294467"/>
+            <a:ext cx="135468" cy="383042"/>
+          </a:xfrm>
+          <a:prstGeom prst="rect">
+            <a:avLst/>
+          </a:prstGeom>
+          <a:noFill/>
+          <a:ln w="3175" cmpd="sng">
+            <a:solidFill>
+              <a:schemeClr val="tx1"/>
+            </a:solidFill>
+          </a:ln>
+          <a:effectLst/>
+        </p:spPr>
+        <p:style>
+          <a:lnRef idx="1">
+            <a:schemeClr val="accent1"/>
+          </a:lnRef>
+          <a:fillRef idx="3">
+            <a:schemeClr val="accent1"/>
+          </a:fillRef>
+          <a:effectRef idx="2">
+            <a:schemeClr val="accent1"/>
+          </a:effectRef>
+          <a:fontRef idx="minor">
+            <a:schemeClr val="lt1"/>
+          </a:fontRef>
+        </p:style>
+        <p:txBody>
+          <a:bodyPr rtlCol="0" anchor="ctr"/>
+          <a:lstStyle/>
+          <a:p>
+            <a:pPr algn="ctr"/>
+            <a:endParaRPr lang="fr-FR"/>
+          </a:p>
+        </p:txBody>
+      </p:sp>
+      <p:sp>
+        <p:nvSpPr>
+          <p:cNvPr id="125" name="Rectangle 124"/>
+          <p:cNvSpPr/>
+          <p:nvPr/>
+        </p:nvSpPr>
+        <p:spPr>
+          <a:xfrm rot="10800000" flipV="1">
+            <a:off x="3813387" y="1963254"/>
+            <a:ext cx="135468" cy="211590"/>
+          </a:xfrm>
+          <a:prstGeom prst="rect">
+            <a:avLst/>
+          </a:prstGeom>
+          <a:noFill/>
+          <a:ln w="3175" cmpd="sng">
+            <a:solidFill>
+              <a:schemeClr val="tx1"/>
+            </a:solidFill>
+          </a:ln>
+          <a:effectLst/>
+        </p:spPr>
+        <p:style>
+          <a:lnRef idx="1">
+            <a:schemeClr val="accent1"/>
+          </a:lnRef>
+          <a:fillRef idx="3">
+            <a:schemeClr val="accent1"/>
+          </a:fillRef>
+          <a:effectRef idx="2">
+            <a:schemeClr val="accent1"/>
+          </a:effectRef>
+          <a:fontRef idx="minor">
+            <a:schemeClr val="lt1"/>
+          </a:fontRef>
+        </p:style>
+        <p:txBody>
+          <a:bodyPr rtlCol="0" anchor="ctr"/>
+          <a:lstStyle/>
+          <a:p>
+            <a:pPr algn="ctr"/>
+            <a:endParaRPr lang="fr-FR"/>
+          </a:p>
+        </p:txBody>
+      </p:sp>
+      <p:sp>
+        <p:nvSpPr>
+          <p:cNvPr id="126" name="Rectangle 125"/>
+          <p:cNvSpPr/>
+          <p:nvPr/>
+        </p:nvSpPr>
+        <p:spPr>
+          <a:xfrm rot="10800000">
+            <a:off x="3361266" y="3056470"/>
+            <a:ext cx="138022" cy="292094"/>
+          </a:xfrm>
+          <a:prstGeom prst="rect">
+            <a:avLst/>
+          </a:prstGeom>
+          <a:noFill/>
+          <a:ln w="3175" cmpd="sng">
+            <a:solidFill>
+              <a:schemeClr val="tx1"/>
+            </a:solidFill>
+          </a:ln>
+          <a:effectLst/>
+        </p:spPr>
+        <p:style>
+          <a:lnRef idx="1">
+            <a:schemeClr val="accent1"/>
+          </a:lnRef>
+          <a:fillRef idx="3">
+            <a:schemeClr val="accent1"/>
+          </a:fillRef>
+          <a:effectRef idx="2">
+            <a:schemeClr val="accent1"/>
+          </a:effectRef>
+          <a:fontRef idx="minor">
+            <a:schemeClr val="lt1"/>
+          </a:fontRef>
+        </p:style>
+        <p:txBody>
+          <a:bodyPr rtlCol="0" anchor="ctr"/>
+          <a:lstStyle/>
+          <a:p>
+            <a:pPr algn="ctr"/>
+            <a:endParaRPr lang="fr-FR"/>
+          </a:p>
+        </p:txBody>
+      </p:sp>
+      <p:sp>
+        <p:nvSpPr>
+          <p:cNvPr id="127" name="Rectangle 126"/>
+          <p:cNvSpPr/>
+          <p:nvPr/>
+        </p:nvSpPr>
+        <p:spPr>
+          <a:xfrm rot="10800000">
+            <a:off x="3361266" y="2202442"/>
+            <a:ext cx="135468" cy="211590"/>
+          </a:xfrm>
+          <a:prstGeom prst="rect">
+            <a:avLst/>
+          </a:prstGeom>
+          <a:noFill/>
+          <a:ln w="3175" cmpd="sng">
+            <a:solidFill>
+              <a:schemeClr val="tx1"/>
+            </a:solidFill>
+          </a:ln>
+          <a:effectLst/>
+        </p:spPr>
+        <p:style>
+          <a:lnRef idx="1">
+            <a:schemeClr val="accent1"/>
+          </a:lnRef>
+          <a:fillRef idx="3">
+            <a:schemeClr val="accent1"/>
+          </a:fillRef>
+          <a:effectRef idx="2">
+            <a:schemeClr val="accent1"/>
+          </a:effectRef>
+          <a:fontRef idx="minor">
+            <a:schemeClr val="lt1"/>
+          </a:fontRef>
+        </p:style>
+        <p:txBody>
+          <a:bodyPr rtlCol="0" anchor="ctr"/>
+          <a:lstStyle/>
+          <a:p>
+            <a:pPr algn="ctr"/>
+            <a:endParaRPr lang="fr-FR"/>
+          </a:p>
+        </p:txBody>
+      </p:sp>
+      <p:sp>
+        <p:nvSpPr>
+          <p:cNvPr id="128" name="Rectangle 127"/>
+          <p:cNvSpPr/>
+          <p:nvPr/>
+        </p:nvSpPr>
+        <p:spPr>
+          <a:xfrm rot="10800000" flipV="1">
+            <a:off x="2993309" y="3056470"/>
+            <a:ext cx="136800" cy="711194"/>
+          </a:xfrm>
+          <a:prstGeom prst="rect">
+            <a:avLst/>
+          </a:prstGeom>
+          <a:noFill/>
+          <a:ln w="3175" cmpd="sng">
+            <a:solidFill>
+              <a:schemeClr val="tx1"/>
+            </a:solidFill>
+          </a:ln>
+          <a:effectLst/>
+        </p:spPr>
+        <p:style>
+          <a:lnRef idx="1">
+            <a:schemeClr val="accent1"/>
+          </a:lnRef>
+          <a:fillRef idx="3">
+            <a:schemeClr val="accent1"/>
+          </a:fillRef>
+          <a:effectRef idx="2">
+            <a:schemeClr val="accent1"/>
+          </a:effectRef>
+          <a:fontRef idx="minor">
+            <a:schemeClr val="lt1"/>
+          </a:fontRef>
+        </p:style>
+        <p:txBody>
+          <a:bodyPr rtlCol="0" anchor="ctr"/>
+          <a:lstStyle/>
+          <a:p>
+            <a:pPr algn="ctr"/>
+            <a:endParaRPr lang="fr-FR"/>
+          </a:p>
+        </p:txBody>
+      </p:sp>
+      <p:sp>
+        <p:nvSpPr>
+          <p:cNvPr id="129" name="Rectangle 128"/>
+          <p:cNvSpPr/>
+          <p:nvPr/>
+        </p:nvSpPr>
+        <p:spPr>
+          <a:xfrm rot="10800000" flipV="1">
+            <a:off x="3361266" y="1963254"/>
+            <a:ext cx="135468" cy="211590"/>
+          </a:xfrm>
+          <a:prstGeom prst="rect">
+            <a:avLst/>
+          </a:prstGeom>
+          <a:noFill/>
+          <a:ln w="3175" cmpd="sng">
+            <a:solidFill>
+              <a:schemeClr val="tx1"/>
+            </a:solidFill>
+          </a:ln>
+          <a:effectLst/>
+        </p:spPr>
+        <p:style>
+          <a:lnRef idx="1">
+            <a:schemeClr val="accent1"/>
+          </a:lnRef>
+          <a:fillRef idx="3">
+            <a:schemeClr val="accent1"/>
+          </a:fillRef>
+          <a:effectRef idx="2">
+            <a:schemeClr val="accent1"/>
+          </a:effectRef>
+          <a:fontRef idx="minor">
+            <a:schemeClr val="lt1"/>
+          </a:fontRef>
+        </p:style>
+        <p:txBody>
+          <a:bodyPr rtlCol="0" anchor="ctr"/>
+          <a:lstStyle/>
+          <a:p>
+            <a:pPr algn="ctr"/>
+            <a:endParaRPr lang="fr-FR"/>
+          </a:p>
+        </p:txBody>
+      </p:sp>
+      <p:sp>
+        <p:nvSpPr>
+          <p:cNvPr id="107" name="Rectangle 106"/>
+          <p:cNvSpPr/>
+          <p:nvPr/>
+        </p:nvSpPr>
+        <p:spPr>
+          <a:xfrm rot="16200000">
+            <a:off x="5181024" y="2848345"/>
+            <a:ext cx="135468" cy="272308"/>
+          </a:xfrm>
+          <a:prstGeom prst="rect">
+            <a:avLst/>
+          </a:prstGeom>
+          <a:noFill/>
+          <a:ln w="3175" cmpd="sng">
+            <a:solidFill>
+              <a:schemeClr val="tx1"/>
+            </a:solidFill>
+          </a:ln>
+          <a:effectLst/>
+        </p:spPr>
+        <p:style>
+          <a:lnRef idx="1">
+            <a:schemeClr val="accent1"/>
+          </a:lnRef>
+          <a:fillRef idx="3">
+            <a:schemeClr val="accent1"/>
+          </a:fillRef>
+          <a:effectRef idx="2">
+            <a:schemeClr val="accent1"/>
+          </a:effectRef>
+          <a:fontRef idx="minor">
+            <a:schemeClr val="lt1"/>
+          </a:fontRef>
+        </p:style>
+        <p:txBody>
+          <a:bodyPr rtlCol="0" anchor="ctr"/>
+          <a:lstStyle/>
+          <a:p>
+            <a:pPr algn="ctr"/>
+            <a:endParaRPr lang="fr-FR"/>
+          </a:p>
+        </p:txBody>
+      </p:sp>
+      <p:sp>
+        <p:nvSpPr>
+          <p:cNvPr id="108" name="Rectangle 107"/>
+          <p:cNvSpPr/>
+          <p:nvPr/>
+        </p:nvSpPr>
+        <p:spPr>
+          <a:xfrm rot="16200000">
+            <a:off x="5181024" y="3144676"/>
+            <a:ext cx="135468" cy="272308"/>
+          </a:xfrm>
+          <a:prstGeom prst="rect">
+            <a:avLst/>
+          </a:prstGeom>
+          <a:noFill/>
+          <a:ln w="3175" cmpd="sng">
+            <a:solidFill>
+              <a:schemeClr val="tx1"/>
+            </a:solidFill>
+          </a:ln>
+          <a:effectLst/>
+        </p:spPr>
+        <p:style>
+          <a:lnRef idx="1">
+            <a:schemeClr val="accent1"/>
+          </a:lnRef>
+          <a:fillRef idx="3">
+            <a:schemeClr val="accent1"/>
+          </a:fillRef>
+          <a:effectRef idx="2">
+            <a:schemeClr val="accent1"/>
+          </a:effectRef>
+          <a:fontRef idx="minor">
+            <a:schemeClr val="lt1"/>
+          </a:fontRef>
+        </p:style>
+        <p:txBody>
+          <a:bodyPr rtlCol="0" anchor="ctr"/>
+          <a:lstStyle/>
+          <a:p>
+            <a:pPr algn="ctr"/>
+            <a:endParaRPr lang="fr-FR"/>
+          </a:p>
+        </p:txBody>
+      </p:sp>
+      <p:sp>
+        <p:nvSpPr>
+          <p:cNvPr id="113" name="Rectangle 112"/>
+          <p:cNvSpPr/>
+          <p:nvPr/>
+        </p:nvSpPr>
+        <p:spPr>
+          <a:xfrm rot="16200000">
+            <a:off x="5181024" y="3441008"/>
+            <a:ext cx="135468" cy="272308"/>
+          </a:xfrm>
+          <a:prstGeom prst="rect">
+            <a:avLst/>
+          </a:prstGeom>
+          <a:noFill/>
+          <a:ln w="3175" cmpd="sng">
+            <a:solidFill>
+              <a:schemeClr val="tx1"/>
+            </a:solidFill>
+          </a:ln>
+          <a:effectLst/>
+        </p:spPr>
+        <p:style>
+          <a:lnRef idx="1">
+            <a:schemeClr val="accent1"/>
+          </a:lnRef>
+          <a:fillRef idx="3">
+            <a:schemeClr val="accent1"/>
+          </a:fillRef>
+          <a:effectRef idx="2">
+            <a:schemeClr val="accent1"/>
+          </a:effectRef>
+          <a:fontRef idx="minor">
+            <a:schemeClr val="lt1"/>
+          </a:fontRef>
+        </p:style>
+        <p:txBody>
+          <a:bodyPr rtlCol="0" anchor="ctr"/>
+          <a:lstStyle/>
+          <a:p>
+            <a:pPr algn="ctr"/>
+            <a:endParaRPr lang="fr-FR"/>
+          </a:p>
+        </p:txBody>
+      </p:sp>
+      <p:sp>
+        <p:nvSpPr>
+          <p:cNvPr id="114" name="Rectangle 113"/>
+          <p:cNvSpPr/>
+          <p:nvPr/>
+        </p:nvSpPr>
+        <p:spPr>
+          <a:xfrm rot="10800000">
+            <a:off x="5585910" y="2844722"/>
+            <a:ext cx="135468" cy="503841"/>
+          </a:xfrm>
+          <a:prstGeom prst="rect">
+            <a:avLst/>
+          </a:prstGeom>
+          <a:noFill/>
+          <a:ln w="3175" cmpd="sng">
+            <a:solidFill>
+              <a:schemeClr val="tx1"/>
+            </a:solidFill>
+          </a:ln>
+          <a:effectLst/>
+        </p:spPr>
+        <p:style>
+          <a:lnRef idx="1">
+            <a:schemeClr val="accent1"/>
+          </a:lnRef>
+          <a:fillRef idx="3">
+            <a:schemeClr val="accent1"/>
+          </a:fillRef>
+          <a:effectRef idx="2">
+            <a:schemeClr val="accent1"/>
+          </a:effectRef>
+          <a:fontRef idx="minor">
+            <a:schemeClr val="lt1"/>
+          </a:fontRef>
+        </p:style>
+        <p:txBody>
+          <a:bodyPr rtlCol="0" anchor="ctr"/>
+          <a:lstStyle/>
+          <a:p>
+            <a:pPr algn="ctr"/>
+            <a:endParaRPr lang="fr-FR"/>
+          </a:p>
+        </p:txBody>
+      </p:sp>
+      <p:sp>
+        <p:nvSpPr>
+          <p:cNvPr id="117" name="Rectangle 116"/>
+          <p:cNvSpPr/>
+          <p:nvPr/>
+        </p:nvSpPr>
+        <p:spPr>
+          <a:xfrm rot="10800000">
+            <a:off x="5585910" y="3483953"/>
+            <a:ext cx="135468" cy="211590"/>
+          </a:xfrm>
+          <a:prstGeom prst="rect">
+            <a:avLst/>
+          </a:prstGeom>
+          <a:noFill/>
+          <a:ln w="3175" cmpd="sng">
+            <a:solidFill>
+              <a:schemeClr val="tx1"/>
+            </a:solidFill>
+          </a:ln>
+          <a:effectLst/>
+        </p:spPr>
+        <p:style>
+          <a:lnRef idx="1">
+            <a:schemeClr val="accent1"/>
+          </a:lnRef>
+          <a:fillRef idx="3">
+            <a:schemeClr val="accent1"/>
+          </a:fillRef>
+          <a:effectRef idx="2">
+            <a:schemeClr val="accent1"/>
+          </a:effectRef>
+          <a:fontRef idx="minor">
+            <a:schemeClr val="lt1"/>
+          </a:fontRef>
+        </p:style>
+        <p:txBody>
+          <a:bodyPr rtlCol="0" anchor="ctr"/>
+          <a:lstStyle/>
+          <a:p>
+            <a:pPr algn="ctr"/>
+            <a:endParaRPr lang="fr-FR"/>
+          </a:p>
+        </p:txBody>
+      </p:sp>
+      <p:sp>
+        <p:nvSpPr>
+          <p:cNvPr id="122" name="Rectangle 121"/>
+          <p:cNvSpPr/>
+          <p:nvPr/>
+        </p:nvSpPr>
+        <p:spPr>
+          <a:xfrm rot="10800000">
+            <a:off x="4773734" y="2844719"/>
+            <a:ext cx="135468" cy="211590"/>
+          </a:xfrm>
+          <a:prstGeom prst="rect">
+            <a:avLst/>
+          </a:prstGeom>
+          <a:noFill/>
+          <a:ln w="3175" cmpd="sng">
+            <a:solidFill>
+              <a:schemeClr val="tx1"/>
+            </a:solidFill>
+          </a:ln>
+          <a:effectLst/>
+        </p:spPr>
+        <p:style>
+          <a:lnRef idx="1">
+            <a:schemeClr val="accent1"/>
+          </a:lnRef>
+          <a:fillRef idx="3">
+            <a:schemeClr val="accent1"/>
+          </a:fillRef>
+          <a:effectRef idx="2">
+            <a:schemeClr val="accent1"/>
+          </a:effectRef>
+          <a:fontRef idx="minor">
+            <a:schemeClr val="lt1"/>
+          </a:fontRef>
+        </p:style>
+        <p:txBody>
+          <a:bodyPr rtlCol="0" anchor="ctr"/>
+          <a:lstStyle/>
+          <a:p>
+            <a:pPr algn="ctr"/>
+            <a:endParaRPr lang="fr-FR"/>
+          </a:p>
+        </p:txBody>
+      </p:sp>
+      <p:sp>
+        <p:nvSpPr>
+          <p:cNvPr id="134" name="Rectangle 133"/>
+          <p:cNvSpPr/>
+          <p:nvPr/>
+        </p:nvSpPr>
+        <p:spPr>
+          <a:xfrm rot="10800000">
+            <a:off x="4773734" y="3257623"/>
+            <a:ext cx="135468" cy="211590"/>
+          </a:xfrm>
+          <a:prstGeom prst="rect">
+            <a:avLst/>
+          </a:prstGeom>
+          <a:noFill/>
+          <a:ln w="3175" cmpd="sng">
+            <a:solidFill>
+              <a:schemeClr val="tx1"/>
+            </a:solidFill>
+          </a:ln>
+          <a:effectLst/>
+        </p:spPr>
+        <p:style>
+          <a:lnRef idx="1">
+            <a:schemeClr val="accent1"/>
+          </a:lnRef>
+          <a:fillRef idx="3">
+            <a:schemeClr val="accent1"/>
+          </a:fillRef>
+          <a:effectRef idx="2">
+            <a:schemeClr val="accent1"/>
+          </a:effectRef>
+          <a:fontRef idx="minor">
+            <a:schemeClr val="lt1"/>
+          </a:fontRef>
+        </p:style>
+        <p:txBody>
+          <a:bodyPr rtlCol="0" anchor="ctr"/>
+          <a:lstStyle/>
+          <a:p>
+            <a:pPr algn="ctr"/>
+            <a:endParaRPr lang="fr-FR"/>
+          </a:p>
+        </p:txBody>
+      </p:sp>
+      <p:sp>
+        <p:nvSpPr>
+          <p:cNvPr id="135" name="Rectangle 134"/>
+          <p:cNvSpPr/>
+          <p:nvPr/>
+        </p:nvSpPr>
+        <p:spPr>
+          <a:xfrm rot="10800000">
+            <a:off x="4773734" y="3511551"/>
+            <a:ext cx="135468" cy="211590"/>
+          </a:xfrm>
+          <a:prstGeom prst="rect">
+            <a:avLst/>
+          </a:prstGeom>
+          <a:noFill/>
+          <a:ln w="3175" cmpd="sng">
+            <a:solidFill>
+              <a:schemeClr val="tx1"/>
+            </a:solidFill>
+          </a:ln>
+          <a:effectLst/>
+        </p:spPr>
+        <p:style>
+          <a:lnRef idx="1">
+            <a:schemeClr val="accent1"/>
+          </a:lnRef>
+          <a:fillRef idx="3">
+            <a:schemeClr val="accent1"/>
+          </a:fillRef>
+          <a:effectRef idx="2">
+            <a:schemeClr val="accent1"/>
+          </a:effectRef>
+          <a:fontRef idx="minor">
+            <a:schemeClr val="lt1"/>
+          </a:fontRef>
+        </p:style>
+        <p:txBody>
+          <a:bodyPr rtlCol="0" anchor="ctr"/>
+          <a:lstStyle/>
+          <a:p>
+            <a:pPr algn="ctr"/>
+            <a:endParaRPr lang="fr-FR"/>
+          </a:p>
+        </p:txBody>
+      </p:sp>
+      <p:sp>
+        <p:nvSpPr>
+          <p:cNvPr id="118" name="Rectangle 117"/>
+          <p:cNvSpPr/>
+          <p:nvPr/>
+        </p:nvSpPr>
+        <p:spPr>
+          <a:xfrm rot="10800000">
+            <a:off x="5488993" y="5683252"/>
+            <a:ext cx="135470" cy="704718"/>
+          </a:xfrm>
+          <a:prstGeom prst="rect">
+            <a:avLst/>
+          </a:prstGeom>
+          <a:noFill/>
+          <a:ln w="3175" cmpd="sng">
+            <a:solidFill>
+              <a:schemeClr val="tx1"/>
+            </a:solidFill>
+          </a:ln>
+          <a:effectLst/>
+        </p:spPr>
+        <p:style>
+          <a:lnRef idx="1">
+            <a:schemeClr val="accent1"/>
+          </a:lnRef>
+          <a:fillRef idx="3">
+            <a:schemeClr val="accent1"/>
+          </a:fillRef>
+          <a:effectRef idx="2">
+            <a:schemeClr val="accent1"/>
+          </a:effectRef>
+          <a:fontRef idx="minor">
+            <a:schemeClr val="lt1"/>
+          </a:fontRef>
+        </p:style>
+        <p:txBody>
+          <a:bodyPr rtlCol="0" anchor="ctr"/>
+          <a:lstStyle/>
+          <a:p>
+            <a:pPr algn="ctr"/>
+            <a:endParaRPr lang="fr-FR"/>
+          </a:p>
+        </p:txBody>
+      </p:sp>
+      <p:sp>
+        <p:nvSpPr>
+          <p:cNvPr id="121" name="Rectangle 120"/>
+          <p:cNvSpPr/>
+          <p:nvPr/>
+        </p:nvSpPr>
+        <p:spPr>
+          <a:xfrm rot="10800000">
+            <a:off x="6258351" y="5683253"/>
+            <a:ext cx="135470" cy="704718"/>
+          </a:xfrm>
+          <a:prstGeom prst="rect">
+            <a:avLst/>
+          </a:prstGeom>
+          <a:noFill/>
+          <a:ln w="3175" cmpd="sng">
+            <a:solidFill>
+              <a:schemeClr val="tx1"/>
+            </a:solidFill>
+          </a:ln>
+          <a:effectLst/>
+        </p:spPr>
+        <p:style>
+          <a:lnRef idx="1">
+            <a:schemeClr val="accent1"/>
+          </a:lnRef>
+          <a:fillRef idx="3">
+            <a:schemeClr val="accent1"/>
+          </a:fillRef>
+          <a:effectRef idx="2">
+            <a:schemeClr val="accent1"/>
+          </a:effectRef>
+          <a:fontRef idx="minor">
+            <a:schemeClr val="lt1"/>
+          </a:fontRef>
+        </p:style>
+        <p:txBody>
+          <a:bodyPr rtlCol="0" anchor="ctr"/>
+          <a:lstStyle/>
+          <a:p>
+            <a:pPr algn="ctr"/>
+            <a:endParaRPr lang="fr-FR"/>
+          </a:p>
+        </p:txBody>
+      </p:sp>
+      <p:sp>
+        <p:nvSpPr>
+          <p:cNvPr id="136" name="Rectangle 135"/>
+          <p:cNvSpPr/>
+          <p:nvPr/>
+        </p:nvSpPr>
+        <p:spPr>
+          <a:xfrm rot="10800000">
+            <a:off x="7027706" y="5683254"/>
+            <a:ext cx="135470" cy="704718"/>
+          </a:xfrm>
+          <a:prstGeom prst="rect">
+            <a:avLst/>
+          </a:prstGeom>
+          <a:noFill/>
+          <a:ln w="3175" cmpd="sng">
+            <a:solidFill>
+              <a:schemeClr val="tx1"/>
+            </a:solidFill>
+          </a:ln>
+          <a:effectLst/>
+        </p:spPr>
+        <p:style>
+          <a:lnRef idx="1">
+            <a:schemeClr val="accent1"/>
+          </a:lnRef>
+          <a:fillRef idx="3">
+            <a:schemeClr val="accent1"/>
+          </a:fillRef>
+          <a:effectRef idx="2">
+            <a:schemeClr val="accent1"/>
+          </a:effectRef>
+          <a:fontRef idx="minor">
+            <a:schemeClr val="lt1"/>
+          </a:fontRef>
+        </p:style>
+        <p:txBody>
+          <a:bodyPr rtlCol="0" anchor="ctr"/>
+          <a:lstStyle/>
+          <a:p>
+            <a:pPr algn="ctr"/>
+            <a:endParaRPr lang="fr-FR"/>
+          </a:p>
+        </p:txBody>
+      </p:sp>
+      <p:sp>
+        <p:nvSpPr>
+          <p:cNvPr id="137" name="Rectangle 136"/>
+          <p:cNvSpPr/>
+          <p:nvPr/>
+        </p:nvSpPr>
+        <p:spPr>
+          <a:xfrm>
+            <a:off x="6218617" y="3786714"/>
+            <a:ext cx="226484" cy="1725086"/>
+          </a:xfrm>
+          <a:prstGeom prst="rect">
+            <a:avLst/>
+          </a:prstGeom>
+          <a:solidFill>
+            <a:schemeClr val="bg1">
+              <a:lumMod val="85000"/>
+            </a:schemeClr>
+          </a:solidFill>
+          <a:ln>
+            <a:noFill/>
+          </a:ln>
+          <a:effectLst/>
+        </p:spPr>
+        <p:style>
+          <a:lnRef idx="1">
+            <a:schemeClr val="accent1"/>
+          </a:lnRef>
+          <a:fillRef idx="3">
+            <a:schemeClr val="accent1"/>
+          </a:fillRef>
+          <a:effectRef idx="2">
+            <a:schemeClr val="accent1"/>
+          </a:effectRef>
+          <a:fontRef idx="minor">
+            <a:schemeClr val="lt1"/>
+          </a:fontRef>
+        </p:style>
+        <p:txBody>
+          <a:bodyPr rtlCol="0" anchor="ctr"/>
+          <a:lstStyle/>
+          <a:p>
+            <a:pPr algn="ctr"/>
+            <a:endParaRPr lang="fr-FR"/>
+          </a:p>
+        </p:txBody>
+      </p:sp>
+      <p:grpSp>
+        <p:nvGrpSpPr>
+          <p:cNvPr id="138" name="Grouper 137"/>
+          <p:cNvGrpSpPr/>
+          <p:nvPr/>
+        </p:nvGrpSpPr>
+        <p:grpSpPr>
+          <a:xfrm>
+            <a:off x="3780071" y="4021593"/>
+            <a:ext cx="613834" cy="257973"/>
+            <a:chOff x="2597151" y="4019475"/>
+            <a:chExt cx="471915" cy="146125"/>
+          </a:xfrm>
+        </p:grpSpPr>
+        <p:cxnSp>
+          <p:nvCxnSpPr>
+            <p:cNvPr id="139" name="Connecteur droit 138"/>
+            <p:cNvCxnSpPr/>
+            <p:nvPr/>
+          </p:nvCxnSpPr>
+          <p:spPr>
+            <a:xfrm flipV="1">
+              <a:off x="2841932" y="4019475"/>
+              <a:ext cx="0" cy="146125"/>
+            </a:xfrm>
+            <a:prstGeom prst="line">
+              <a:avLst/>
+            </a:prstGeom>
+            <a:ln w="76200" cmpd="sng">
+              <a:solidFill>
+                <a:schemeClr val="tx1"/>
+              </a:solidFill>
+            </a:ln>
+            <a:effectLst/>
+          </p:spPr>
+          <p:style>
+            <a:lnRef idx="2">
+              <a:schemeClr val="accent1"/>
+            </a:lnRef>
+            <a:fillRef idx="0">
+              <a:schemeClr val="accent1"/>
+            </a:fillRef>
+            <a:effectRef idx="1">
+              <a:schemeClr val="accent1"/>
+            </a:effectRef>
+            <a:fontRef idx="minor">
+              <a:schemeClr val="tx1"/>
+            </a:fontRef>
+          </p:style>
+        </p:cxnSp>
+        <p:cxnSp>
+          <p:nvCxnSpPr>
+            <p:cNvPr id="140" name="Connecteur droit 139"/>
+            <p:cNvCxnSpPr/>
+            <p:nvPr/>
+          </p:nvCxnSpPr>
+          <p:spPr>
+            <a:xfrm flipH="1">
+              <a:off x="2597151" y="4019475"/>
+              <a:ext cx="471915" cy="0"/>
+            </a:xfrm>
+            <a:prstGeom prst="line">
+              <a:avLst/>
+            </a:prstGeom>
+            <a:ln w="38100" cmpd="sng">
+              <a:solidFill>
+                <a:schemeClr val="tx1"/>
+              </a:solidFill>
+            </a:ln>
+            <a:effectLst/>
+          </p:spPr>
+          <p:style>
+            <a:lnRef idx="2">
+              <a:schemeClr val="accent1"/>
+            </a:lnRef>
+            <a:fillRef idx="0">
+              <a:schemeClr val="accent1"/>
+            </a:fillRef>
+            <a:effectRef idx="1">
+              <a:schemeClr val="accent1"/>
+            </a:effectRef>
+            <a:fontRef idx="minor">
+              <a:schemeClr val="tx1"/>
+            </a:fontRef>
+          </p:style>
+        </p:cxnSp>
+      </p:grpSp>
+      <p:grpSp>
+        <p:nvGrpSpPr>
+          <p:cNvPr id="141" name="Grouper 140"/>
+          <p:cNvGrpSpPr/>
+          <p:nvPr/>
+        </p:nvGrpSpPr>
+        <p:grpSpPr>
+          <a:xfrm>
+            <a:off x="4677241" y="4021593"/>
+            <a:ext cx="613834" cy="257973"/>
+            <a:chOff x="2597151" y="4019475"/>
+            <a:chExt cx="471915" cy="146125"/>
+          </a:xfrm>
+        </p:grpSpPr>
+        <p:cxnSp>
+          <p:nvCxnSpPr>
+            <p:cNvPr id="142" name="Connecteur droit 141"/>
+            <p:cNvCxnSpPr/>
+            <p:nvPr/>
+          </p:nvCxnSpPr>
+          <p:spPr>
+            <a:xfrm flipV="1">
+              <a:off x="2841932" y="4019475"/>
+              <a:ext cx="0" cy="146125"/>
+            </a:xfrm>
+            <a:prstGeom prst="line">
+              <a:avLst/>
+            </a:prstGeom>
+            <a:ln w="76200" cmpd="sng">
+              <a:solidFill>
+                <a:schemeClr val="tx1"/>
+              </a:solidFill>
+            </a:ln>
+            <a:effectLst/>
+          </p:spPr>
+          <p:style>
+            <a:lnRef idx="2">
+              <a:schemeClr val="accent1"/>
+            </a:lnRef>
+            <a:fillRef idx="0">
+              <a:schemeClr val="accent1"/>
+            </a:fillRef>
+            <a:effectRef idx="1">
+              <a:schemeClr val="accent1"/>
+            </a:effectRef>
+            <a:fontRef idx="minor">
+              <a:schemeClr val="tx1"/>
+            </a:fontRef>
+          </p:style>
+        </p:cxnSp>
+        <p:cxnSp>
+          <p:nvCxnSpPr>
+            <p:cNvPr id="143" name="Connecteur droit 142"/>
+            <p:cNvCxnSpPr/>
+            <p:nvPr/>
+          </p:nvCxnSpPr>
+          <p:spPr>
+            <a:xfrm flipH="1">
+              <a:off x="2597151" y="4019475"/>
+              <a:ext cx="471915" cy="0"/>
+            </a:xfrm>
+            <a:prstGeom prst="line">
+              <a:avLst/>
+            </a:prstGeom>
+            <a:ln w="38100" cmpd="sng">
+              <a:solidFill>
+                <a:schemeClr val="tx1"/>
+              </a:solidFill>
+            </a:ln>
+            <a:effectLst/>
+          </p:spPr>
+          <p:style>
+            <a:lnRef idx="2">
+              <a:schemeClr val="accent1"/>
+            </a:lnRef>
+            <a:fillRef idx="0">
+              <a:schemeClr val="accent1"/>
+            </a:fillRef>
+            <a:effectRef idx="1">
+              <a:schemeClr val="accent1"/>
+            </a:effectRef>
+            <a:fontRef idx="minor">
+              <a:schemeClr val="tx1"/>
+            </a:fontRef>
+          </p:style>
+        </p:cxnSp>
+      </p:grpSp>
+      <p:grpSp>
+        <p:nvGrpSpPr>
+          <p:cNvPr id="144" name="Grouper 143"/>
+          <p:cNvGrpSpPr/>
+          <p:nvPr/>
+        </p:nvGrpSpPr>
+        <p:grpSpPr>
+          <a:xfrm>
+            <a:off x="5574411" y="4021593"/>
+            <a:ext cx="613834" cy="257973"/>
+            <a:chOff x="2597151" y="4019475"/>
+            <a:chExt cx="471915" cy="146125"/>
+          </a:xfrm>
+        </p:grpSpPr>
+        <p:cxnSp>
+          <p:nvCxnSpPr>
+            <p:cNvPr id="145" name="Connecteur droit 144"/>
+            <p:cNvCxnSpPr/>
+            <p:nvPr/>
+          </p:nvCxnSpPr>
+          <p:spPr>
+            <a:xfrm flipV="1">
+              <a:off x="2841932" y="4019475"/>
+              <a:ext cx="0" cy="146125"/>
+            </a:xfrm>
+            <a:prstGeom prst="line">
+              <a:avLst/>
+            </a:prstGeom>
+            <a:ln w="76200" cmpd="sng">
+              <a:solidFill>
+                <a:schemeClr val="tx1"/>
+              </a:solidFill>
+            </a:ln>
+            <a:effectLst/>
+          </p:spPr>
+          <p:style>
+            <a:lnRef idx="2">
+              <a:schemeClr val="accent1"/>
+            </a:lnRef>
+            <a:fillRef idx="0">
+              <a:schemeClr val="accent1"/>
+            </a:fillRef>
+            <a:effectRef idx="1">
+              <a:schemeClr val="accent1"/>
+            </a:effectRef>
+            <a:fontRef idx="minor">
+              <a:schemeClr val="tx1"/>
+            </a:fontRef>
+          </p:style>
+        </p:cxnSp>
+        <p:cxnSp>
+          <p:nvCxnSpPr>
+            <p:cNvPr id="146" name="Connecteur droit 145"/>
+            <p:cNvCxnSpPr/>
+            <p:nvPr/>
+          </p:nvCxnSpPr>
+          <p:spPr>
+            <a:xfrm flipH="1">
+              <a:off x="2597151" y="4019475"/>
+              <a:ext cx="471915" cy="0"/>
+            </a:xfrm>
+            <a:prstGeom prst="line">
+              <a:avLst/>
+            </a:prstGeom>
+            <a:ln w="38100" cmpd="sng">
+              <a:solidFill>
+                <a:schemeClr val="tx1"/>
+              </a:solidFill>
+            </a:ln>
+            <a:effectLst/>
+          </p:spPr>
+          <p:style>
+            <a:lnRef idx="2">
+              <a:schemeClr val="accent1"/>
+            </a:lnRef>
+            <a:fillRef idx="0">
+              <a:schemeClr val="accent1"/>
+            </a:fillRef>
+            <a:effectRef idx="1">
+              <a:schemeClr val="accent1"/>
+            </a:effectRef>
+            <a:fontRef idx="minor">
+              <a:schemeClr val="tx1"/>
+            </a:fontRef>
+          </p:style>
+        </p:cxnSp>
+      </p:grpSp>
+      <p:grpSp>
+        <p:nvGrpSpPr>
+          <p:cNvPr id="147" name="Grouper 146"/>
+          <p:cNvGrpSpPr/>
+          <p:nvPr/>
+        </p:nvGrpSpPr>
+        <p:grpSpPr>
+          <a:xfrm>
+            <a:off x="6471582" y="4021593"/>
+            <a:ext cx="907117" cy="257973"/>
+            <a:chOff x="2597151" y="4019475"/>
+            <a:chExt cx="697391" cy="146125"/>
+          </a:xfrm>
+        </p:grpSpPr>
+        <p:cxnSp>
+          <p:nvCxnSpPr>
+            <p:cNvPr id="148" name="Connecteur droit 147"/>
+            <p:cNvCxnSpPr/>
+            <p:nvPr/>
+          </p:nvCxnSpPr>
+          <p:spPr>
+            <a:xfrm flipV="1">
+              <a:off x="2841932" y="4019475"/>
+              <a:ext cx="0" cy="146125"/>
+            </a:xfrm>
+            <a:prstGeom prst="line">
+              <a:avLst/>
+            </a:prstGeom>
+            <a:ln w="76200" cmpd="sng">
+              <a:solidFill>
+                <a:schemeClr val="tx1"/>
+              </a:solidFill>
+            </a:ln>
+            <a:effectLst/>
+          </p:spPr>
+          <p:style>
+            <a:lnRef idx="2">
+              <a:schemeClr val="accent1"/>
+            </a:lnRef>
+            <a:fillRef idx="0">
+              <a:schemeClr val="accent1"/>
+            </a:fillRef>
+            <a:effectRef idx="1">
+              <a:schemeClr val="accent1"/>
+            </a:effectRef>
+            <a:fontRef idx="minor">
+              <a:schemeClr val="tx1"/>
+            </a:fontRef>
+          </p:style>
+        </p:cxnSp>
+        <p:cxnSp>
+          <p:nvCxnSpPr>
+            <p:cNvPr id="149" name="Connecteur droit 148"/>
+            <p:cNvCxnSpPr/>
+            <p:nvPr/>
+          </p:nvCxnSpPr>
+          <p:spPr>
+            <a:xfrm flipH="1">
+              <a:off x="2597151" y="4019475"/>
+              <a:ext cx="697391" cy="0"/>
+            </a:xfrm>
+            <a:prstGeom prst="line">
+              <a:avLst/>
+            </a:prstGeom>
+            <a:ln w="38100" cmpd="sng">
+              <a:solidFill>
+                <a:schemeClr val="tx1"/>
+              </a:solidFill>
+            </a:ln>
+            <a:effectLst/>
+          </p:spPr>
+          <p:style>
+            <a:lnRef idx="2">
+              <a:schemeClr val="accent1"/>
+            </a:lnRef>
+            <a:fillRef idx="0">
+              <a:schemeClr val="accent1"/>
+            </a:fillRef>
+            <a:effectRef idx="1">
+              <a:schemeClr val="accent1"/>
+            </a:effectRef>
+            <a:fontRef idx="minor">
+              <a:schemeClr val="tx1"/>
+            </a:fontRef>
+          </p:style>
+        </p:cxnSp>
+      </p:grpSp>
+      <p:sp>
+        <p:nvSpPr>
+          <p:cNvPr id="6" name="Ellipse 5"/>
+          <p:cNvSpPr/>
+          <p:nvPr/>
+        </p:nvSpPr>
+        <p:spPr>
+          <a:xfrm>
+            <a:off x="4675184" y="5689599"/>
+            <a:ext cx="216000" cy="216000"/>
+          </a:xfrm>
+          <a:prstGeom prst="ellipse">
+            <a:avLst/>
+          </a:prstGeom>
+          <a:solidFill>
+            <a:schemeClr val="bg1"/>
+          </a:solidFill>
+          <a:ln>
+            <a:solidFill>
+              <a:schemeClr val="tx1"/>
+            </a:solidFill>
+          </a:ln>
+          <a:effectLst/>
+        </p:spPr>
+        <p:style>
+          <a:lnRef idx="1">
+            <a:schemeClr val="accent1"/>
+          </a:lnRef>
+          <a:fillRef idx="3">
+            <a:schemeClr val="accent1"/>
+          </a:fillRef>
+          <a:effectRef idx="2">
+            <a:schemeClr val="accent1"/>
+          </a:effectRef>
+          <a:fontRef idx="minor">
+            <a:schemeClr val="lt1"/>
+          </a:fontRef>
+        </p:style>
+        <p:txBody>
+          <a:bodyPr rtlCol="0" anchor="ctr"/>
+          <a:lstStyle/>
+          <a:p>
+            <a:pPr algn="ctr"/>
+            <a:endParaRPr lang="fr-FR"/>
+          </a:p>
+        </p:txBody>
+      </p:sp>
+      <p:sp>
+        <p:nvSpPr>
+          <p:cNvPr id="151" name="Rectangle 150"/>
+          <p:cNvSpPr/>
+          <p:nvPr/>
+        </p:nvSpPr>
+        <p:spPr>
+          <a:xfrm rot="16200000">
+            <a:off x="2412368" y="4963459"/>
+            <a:ext cx="135468" cy="211590"/>
+          </a:xfrm>
+          <a:prstGeom prst="rect">
+            <a:avLst/>
+          </a:prstGeom>
+          <a:noFill/>
+          <a:ln w="3175" cmpd="sng">
+            <a:solidFill>
+              <a:schemeClr val="tx1"/>
+            </a:solidFill>
+          </a:ln>
+          <a:effectLst/>
+        </p:spPr>
+        <p:style>
+          <a:lnRef idx="1">
+            <a:schemeClr val="accent1"/>
+          </a:lnRef>
+          <a:fillRef idx="3">
+            <a:schemeClr val="accent1"/>
+          </a:fillRef>
+          <a:effectRef idx="2">
+            <a:schemeClr val="accent1"/>
+          </a:effectRef>
+          <a:fontRef idx="minor">
+            <a:schemeClr val="lt1"/>
+          </a:fontRef>
+        </p:style>
+        <p:txBody>
+          <a:bodyPr rtlCol="0" anchor="ctr"/>
+          <a:lstStyle/>
+          <a:p>
+            <a:pPr algn="ctr"/>
+            <a:endParaRPr lang="fr-FR"/>
+          </a:p>
+        </p:txBody>
+      </p:sp>
+      <p:sp>
+        <p:nvSpPr>
+          <p:cNvPr id="152" name="Rectangle 151"/>
+          <p:cNvSpPr/>
+          <p:nvPr/>
+        </p:nvSpPr>
+        <p:spPr>
+          <a:xfrm rot="16200000">
+            <a:off x="2412368" y="4567556"/>
+            <a:ext cx="135468" cy="211590"/>
+          </a:xfrm>
+          <a:prstGeom prst="rect">
+            <a:avLst/>
+          </a:prstGeom>
+          <a:noFill/>
+          <a:ln w="3175" cmpd="sng">
+            <a:solidFill>
+              <a:schemeClr val="tx1"/>
+            </a:solidFill>
+          </a:ln>
+          <a:effectLst/>
+        </p:spPr>
+        <p:style>
+          <a:lnRef idx="1">
+            <a:schemeClr val="accent1"/>
+          </a:lnRef>
+          <a:fillRef idx="3">
+            <a:schemeClr val="accent1"/>
+          </a:fillRef>
+          <a:effectRef idx="2">
+            <a:schemeClr val="accent1"/>
+          </a:effectRef>
+          <a:fontRef idx="minor">
+            <a:schemeClr val="lt1"/>
+          </a:fontRef>
+        </p:style>
+        <p:txBody>
+          <a:bodyPr rtlCol="0" anchor="ctr"/>
+          <a:lstStyle/>
+          <a:p>
+            <a:pPr algn="ctr"/>
+            <a:endParaRPr lang="fr-FR"/>
+          </a:p>
+        </p:txBody>
+      </p:sp>
+      <p:sp>
+        <p:nvSpPr>
+          <p:cNvPr id="153" name="Rectangle 152"/>
+          <p:cNvSpPr/>
+          <p:nvPr/>
+        </p:nvSpPr>
+        <p:spPr>
+          <a:xfrm rot="16200000">
+            <a:off x="2412368" y="4171653"/>
+            <a:ext cx="135468" cy="211590"/>
+          </a:xfrm>
+          <a:prstGeom prst="rect">
+            <a:avLst/>
+          </a:prstGeom>
+          <a:noFill/>
+          <a:ln w="3175" cmpd="sng">
+            <a:solidFill>
+              <a:schemeClr val="tx1"/>
+            </a:solidFill>
+          </a:ln>
+          <a:effectLst/>
+        </p:spPr>
+        <p:style>
+          <a:lnRef idx="1">
+            <a:schemeClr val="accent1"/>
+          </a:lnRef>
+          <a:fillRef idx="3">
+            <a:schemeClr val="accent1"/>
+          </a:fillRef>
+          <a:effectRef idx="2">
+            <a:schemeClr val="accent1"/>
+          </a:effectRef>
+          <a:fontRef idx="minor">
+            <a:schemeClr val="lt1"/>
+          </a:fontRef>
+        </p:style>
+        <p:txBody>
+          <a:bodyPr rtlCol="0" anchor="ctr"/>
+          <a:lstStyle/>
+          <a:p>
+            <a:pPr algn="ctr"/>
+            <a:endParaRPr lang="fr-FR"/>
+          </a:p>
+        </p:txBody>
+      </p:sp>
+      <p:sp>
+        <p:nvSpPr>
+          <p:cNvPr id="154" name="Rectangle 153"/>
+          <p:cNvSpPr/>
+          <p:nvPr/>
+        </p:nvSpPr>
+        <p:spPr>
+          <a:xfrm rot="16200000">
+            <a:off x="2409841" y="5359362"/>
+            <a:ext cx="135468" cy="211590"/>
+          </a:xfrm>
+          <a:prstGeom prst="rect">
+            <a:avLst/>
+          </a:prstGeom>
+          <a:noFill/>
+          <a:ln w="3175" cmpd="sng">
+            <a:solidFill>
+              <a:schemeClr val="tx1"/>
+            </a:solidFill>
+          </a:ln>
+          <a:effectLst/>
+        </p:spPr>
+        <p:style>
+          <a:lnRef idx="1">
+            <a:schemeClr val="accent1"/>
+          </a:lnRef>
+          <a:fillRef idx="3">
+            <a:schemeClr val="accent1"/>
+          </a:fillRef>
+          <a:effectRef idx="2">
+            <a:schemeClr val="accent1"/>
+          </a:effectRef>
+          <a:fontRef idx="minor">
+            <a:schemeClr val="lt1"/>
+          </a:fontRef>
+        </p:style>
+        <p:txBody>
+          <a:bodyPr rtlCol="0" anchor="ctr"/>
+          <a:lstStyle/>
+          <a:p>
+            <a:pPr algn="ctr"/>
+            <a:endParaRPr lang="fr-FR"/>
+          </a:p>
+        </p:txBody>
+      </p:sp>
+      <p:sp>
+        <p:nvSpPr>
+          <p:cNvPr id="155" name="Rectangle 154"/>
+          <p:cNvSpPr/>
+          <p:nvPr/>
+        </p:nvSpPr>
+        <p:spPr>
+          <a:xfrm rot="16200000">
+            <a:off x="2418757" y="5755265"/>
+            <a:ext cx="135468" cy="211590"/>
+          </a:xfrm>
+          <a:prstGeom prst="rect">
+            <a:avLst/>
+          </a:prstGeom>
+          <a:noFill/>
+          <a:ln w="3175" cmpd="sng">
+            <a:solidFill>
+              <a:schemeClr val="tx1"/>
+            </a:solidFill>
+          </a:ln>
+          <a:effectLst/>
+        </p:spPr>
+        <p:style>
+          <a:lnRef idx="1">
+            <a:schemeClr val="accent1"/>
+          </a:lnRef>
+          <a:fillRef idx="3">
+            <a:schemeClr val="accent1"/>
+          </a:fillRef>
+          <a:effectRef idx="2">
+            <a:schemeClr val="accent1"/>
+          </a:effectRef>
+          <a:fontRef idx="minor">
+            <a:schemeClr val="lt1"/>
+          </a:fontRef>
+        </p:style>
+        <p:txBody>
+          <a:bodyPr rtlCol="0" anchor="ctr"/>
+          <a:lstStyle/>
+          <a:p>
+            <a:pPr algn="ctr"/>
+            <a:endParaRPr lang="fr-FR"/>
+          </a:p>
+        </p:txBody>
+      </p:sp>
+      <p:sp>
+        <p:nvSpPr>
+          <p:cNvPr id="156" name="Rectangle 155"/>
+          <p:cNvSpPr/>
+          <p:nvPr/>
+        </p:nvSpPr>
+        <p:spPr>
+          <a:xfrm rot="16200000">
+            <a:off x="2422279" y="6151169"/>
+            <a:ext cx="135468" cy="211590"/>
+          </a:xfrm>
+          <a:prstGeom prst="rect">
+            <a:avLst/>
+          </a:prstGeom>
+          <a:noFill/>
+          <a:ln w="3175" cmpd="sng">
+            <a:solidFill>
+              <a:schemeClr val="tx1"/>
+            </a:solidFill>
+          </a:ln>
+          <a:effectLst/>
+        </p:spPr>
+        <p:style>
+          <a:lnRef idx="1">
+            <a:schemeClr val="accent1"/>
+          </a:lnRef>
+          <a:fillRef idx="3">
+            <a:schemeClr val="accent1"/>
+          </a:fillRef>
+          <a:effectRef idx="2">
+            <a:schemeClr val="accent1"/>
+          </a:effectRef>
+          <a:fontRef idx="minor">
+            <a:schemeClr val="lt1"/>
+          </a:fontRef>
+        </p:style>
+        <p:txBody>
+          <a:bodyPr rtlCol="0" anchor="ctr"/>
+          <a:lstStyle/>
+          <a:p>
+            <a:pPr algn="ctr"/>
+            <a:endParaRPr lang="fr-FR"/>
+          </a:p>
+        </p:txBody>
+      </p:sp>
+      <p:sp>
+        <p:nvSpPr>
+          <p:cNvPr id="157" name="Rectangle 156"/>
+          <p:cNvSpPr/>
+          <p:nvPr/>
+        </p:nvSpPr>
+        <p:spPr>
+          <a:xfrm rot="16200000">
+            <a:off x="3854677" y="4156837"/>
+            <a:ext cx="135468" cy="211590"/>
+          </a:xfrm>
+          <a:prstGeom prst="rect">
+            <a:avLst/>
+          </a:prstGeom>
+          <a:noFill/>
+          <a:ln w="3175" cmpd="sng">
+            <a:solidFill>
+              <a:schemeClr val="tx1"/>
+            </a:solidFill>
+          </a:ln>
+          <a:effectLst/>
+        </p:spPr>
+        <p:style>
+          <a:lnRef idx="1">
+            <a:schemeClr val="accent1"/>
+          </a:lnRef>
+          <a:fillRef idx="3">
+            <a:schemeClr val="accent1"/>
+          </a:fillRef>
+          <a:effectRef idx="2">
+            <a:schemeClr val="accent1"/>
+          </a:effectRef>
+          <a:fontRef idx="minor">
+            <a:schemeClr val="lt1"/>
+          </a:fontRef>
+        </p:style>
+        <p:txBody>
+          <a:bodyPr rtlCol="0" anchor="ctr"/>
+          <a:lstStyle/>
+          <a:p>
+            <a:pPr algn="ctr"/>
+            <a:endParaRPr lang="fr-FR"/>
+          </a:p>
+        </p:txBody>
+      </p:sp>
+      <p:sp>
+        <p:nvSpPr>
+          <p:cNvPr id="158" name="Rectangle 157"/>
+          <p:cNvSpPr/>
+          <p:nvPr/>
+        </p:nvSpPr>
+        <p:spPr>
+          <a:xfrm rot="16200000">
+            <a:off x="4199567" y="4156837"/>
+            <a:ext cx="135468" cy="211590"/>
+          </a:xfrm>
+          <a:prstGeom prst="rect">
+            <a:avLst/>
+          </a:prstGeom>
+          <a:noFill/>
+          <a:ln w="3175" cmpd="sng">
+            <a:solidFill>
+              <a:schemeClr val="tx1"/>
+            </a:solidFill>
+          </a:ln>
+          <a:effectLst/>
+        </p:spPr>
+        <p:style>
+          <a:lnRef idx="1">
+            <a:schemeClr val="accent1"/>
+          </a:lnRef>
+          <a:fillRef idx="3">
+            <a:schemeClr val="accent1"/>
+          </a:fillRef>
+          <a:effectRef idx="2">
+            <a:schemeClr val="accent1"/>
+          </a:effectRef>
+          <a:fontRef idx="minor">
+            <a:schemeClr val="lt1"/>
+          </a:fontRef>
+        </p:style>
+        <p:txBody>
+          <a:bodyPr rtlCol="0" anchor="ctr"/>
+          <a:lstStyle/>
+          <a:p>
+            <a:pPr algn="ctr"/>
+            <a:endParaRPr lang="fr-FR"/>
+          </a:p>
+        </p:txBody>
+      </p:sp>
+      <p:sp>
+        <p:nvSpPr>
+          <p:cNvPr id="159" name="Rectangle 158"/>
+          <p:cNvSpPr/>
+          <p:nvPr/>
+        </p:nvSpPr>
+        <p:spPr>
+          <a:xfrm rot="16200000">
+            <a:off x="2956581" y="4156836"/>
+            <a:ext cx="135468" cy="211590"/>
+          </a:xfrm>
+          <a:prstGeom prst="rect">
+            <a:avLst/>
+          </a:prstGeom>
+          <a:noFill/>
+          <a:ln w="3175" cmpd="sng">
+            <a:solidFill>
+              <a:schemeClr val="tx1"/>
+            </a:solidFill>
+          </a:ln>
+          <a:effectLst/>
+        </p:spPr>
+        <p:style>
+          <a:lnRef idx="1">
+            <a:schemeClr val="accent1"/>
+          </a:lnRef>
+          <a:fillRef idx="3">
+            <a:schemeClr val="accent1"/>
+          </a:fillRef>
+          <a:effectRef idx="2">
+            <a:schemeClr val="accent1"/>
+          </a:effectRef>
+          <a:fontRef idx="minor">
+            <a:schemeClr val="lt1"/>
+          </a:fontRef>
+        </p:style>
+        <p:txBody>
+          <a:bodyPr rtlCol="0" anchor="ctr"/>
+          <a:lstStyle/>
+          <a:p>
+            <a:pPr algn="ctr"/>
+            <a:endParaRPr lang="fr-FR"/>
+          </a:p>
+        </p:txBody>
+      </p:sp>
+      <p:sp>
+        <p:nvSpPr>
+          <p:cNvPr id="160" name="Rectangle 159"/>
+          <p:cNvSpPr/>
+          <p:nvPr/>
+        </p:nvSpPr>
+        <p:spPr>
+          <a:xfrm rot="16200000">
+            <a:off x="3301471" y="4156836"/>
+            <a:ext cx="135468" cy="211590"/>
+          </a:xfrm>
+          <a:prstGeom prst="rect">
+            <a:avLst/>
+          </a:prstGeom>
+          <a:noFill/>
+          <a:ln w="3175" cmpd="sng">
+            <a:solidFill>
+              <a:schemeClr val="tx1"/>
+            </a:solidFill>
+          </a:ln>
+          <a:effectLst/>
+        </p:spPr>
+        <p:style>
+          <a:lnRef idx="1">
+            <a:schemeClr val="accent1"/>
+          </a:lnRef>
+          <a:fillRef idx="3">
+            <a:schemeClr val="accent1"/>
+          </a:fillRef>
+          <a:effectRef idx="2">
+            <a:schemeClr val="accent1"/>
+          </a:effectRef>
+          <a:fontRef idx="minor">
+            <a:schemeClr val="lt1"/>
+          </a:fontRef>
+        </p:style>
+        <p:txBody>
+          <a:bodyPr rtlCol="0" anchor="ctr"/>
+          <a:lstStyle/>
+          <a:p>
+            <a:pPr algn="ctr"/>
+            <a:endParaRPr lang="fr-FR"/>
+          </a:p>
+        </p:txBody>
+      </p:sp>
+      <p:sp>
+        <p:nvSpPr>
+          <p:cNvPr id="161" name="Rectangle 160"/>
+          <p:cNvSpPr/>
+          <p:nvPr/>
+        </p:nvSpPr>
+        <p:spPr>
+          <a:xfrm rot="16200000">
+            <a:off x="4752895" y="4156836"/>
+            <a:ext cx="135468" cy="211590"/>
+          </a:xfrm>
+          <a:prstGeom prst="rect">
+            <a:avLst/>
+          </a:prstGeom>
+          <a:noFill/>
+          <a:ln w="3175" cmpd="sng">
+            <a:solidFill>
+              <a:schemeClr val="tx1"/>
+            </a:solidFill>
+          </a:ln>
+          <a:effectLst/>
+        </p:spPr>
+        <p:style>
+          <a:lnRef idx="1">
+            <a:schemeClr val="accent1"/>
+          </a:lnRef>
+          <a:fillRef idx="3">
+            <a:schemeClr val="accent1"/>
+          </a:fillRef>
+          <a:effectRef idx="2">
+            <a:schemeClr val="accent1"/>
+          </a:effectRef>
+          <a:fontRef idx="minor">
+            <a:schemeClr val="lt1"/>
+          </a:fontRef>
+        </p:style>
+        <p:txBody>
+          <a:bodyPr rtlCol="0" anchor="ctr"/>
+          <a:lstStyle/>
+          <a:p>
+            <a:pPr algn="ctr"/>
+            <a:endParaRPr lang="fr-FR"/>
+          </a:p>
+        </p:txBody>
+      </p:sp>
+      <p:sp>
+        <p:nvSpPr>
+          <p:cNvPr id="162" name="Rectangle 161"/>
+          <p:cNvSpPr/>
+          <p:nvPr/>
+        </p:nvSpPr>
+        <p:spPr>
+          <a:xfrm rot="16200000">
+            <a:off x="5097785" y="4156836"/>
+            <a:ext cx="135468" cy="211590"/>
+          </a:xfrm>
+          <a:prstGeom prst="rect">
+            <a:avLst/>
+          </a:prstGeom>
+          <a:noFill/>
+          <a:ln w="3175" cmpd="sng">
+            <a:solidFill>
+              <a:schemeClr val="tx1"/>
+            </a:solidFill>
+          </a:ln>
+          <a:effectLst/>
+        </p:spPr>
+        <p:style>
+          <a:lnRef idx="1">
+            <a:schemeClr val="accent1"/>
+          </a:lnRef>
+          <a:fillRef idx="3">
+            <a:schemeClr val="accent1"/>
+          </a:fillRef>
+          <a:effectRef idx="2">
+            <a:schemeClr val="accent1"/>
+          </a:effectRef>
+          <a:fontRef idx="minor">
+            <a:schemeClr val="lt1"/>
+          </a:fontRef>
+        </p:style>
+        <p:txBody>
+          <a:bodyPr rtlCol="0" anchor="ctr"/>
+          <a:lstStyle/>
+          <a:p>
+            <a:pPr algn="ctr"/>
+            <a:endParaRPr lang="fr-FR"/>
+          </a:p>
+        </p:txBody>
+      </p:sp>
+      <p:sp>
+        <p:nvSpPr>
+          <p:cNvPr id="163" name="Rectangle 162"/>
+          <p:cNvSpPr/>
+          <p:nvPr/>
+        </p:nvSpPr>
+        <p:spPr>
+          <a:xfrm rot="16200000">
+            <a:off x="5650638" y="4156837"/>
+            <a:ext cx="135468" cy="211590"/>
+          </a:xfrm>
+          <a:prstGeom prst="rect">
+            <a:avLst/>
+          </a:prstGeom>
+          <a:noFill/>
+          <a:ln w="3175" cmpd="sng">
+            <a:solidFill>
+              <a:schemeClr val="tx1"/>
+            </a:solidFill>
+          </a:ln>
+          <a:effectLst/>
+        </p:spPr>
+        <p:style>
+          <a:lnRef idx="1">
+            <a:schemeClr val="accent1"/>
+          </a:lnRef>
+          <a:fillRef idx="3">
+            <a:schemeClr val="accent1"/>
+          </a:fillRef>
+          <a:effectRef idx="2">
+            <a:schemeClr val="accent1"/>
+          </a:effectRef>
+          <a:fontRef idx="minor">
+            <a:schemeClr val="lt1"/>
+          </a:fontRef>
+        </p:style>
+        <p:txBody>
+          <a:bodyPr rtlCol="0" anchor="ctr"/>
+          <a:lstStyle/>
+          <a:p>
+            <a:pPr algn="ctr"/>
+            <a:endParaRPr lang="fr-FR"/>
+          </a:p>
+        </p:txBody>
+      </p:sp>
+      <p:sp>
+        <p:nvSpPr>
+          <p:cNvPr id="164" name="Rectangle 163"/>
+          <p:cNvSpPr/>
+          <p:nvPr/>
+        </p:nvSpPr>
+        <p:spPr>
+          <a:xfrm rot="16200000">
+            <a:off x="5995528" y="4156837"/>
+            <a:ext cx="135468" cy="211590"/>
+          </a:xfrm>
+          <a:prstGeom prst="rect">
+            <a:avLst/>
+          </a:prstGeom>
+          <a:noFill/>
+          <a:ln w="3175" cmpd="sng">
+            <a:solidFill>
+              <a:schemeClr val="tx1"/>
+            </a:solidFill>
+          </a:ln>
+          <a:effectLst/>
+        </p:spPr>
+        <p:style>
+          <a:lnRef idx="1">
+            <a:schemeClr val="accent1"/>
+          </a:lnRef>
+          <a:fillRef idx="3">
+            <a:schemeClr val="accent1"/>
+          </a:fillRef>
+          <a:effectRef idx="2">
+            <a:schemeClr val="accent1"/>
+          </a:effectRef>
+          <a:fontRef idx="minor">
+            <a:schemeClr val="lt1"/>
+          </a:fontRef>
+        </p:style>
+        <p:txBody>
+          <a:bodyPr rtlCol="0" anchor="ctr"/>
+          <a:lstStyle/>
+          <a:p>
+            <a:pPr algn="ctr"/>
+            <a:endParaRPr lang="fr-FR"/>
+          </a:p>
+        </p:txBody>
+      </p:sp>
+      <p:sp>
+        <p:nvSpPr>
+          <p:cNvPr id="150" name="Rectangle 149"/>
+          <p:cNvSpPr/>
+          <p:nvPr/>
+        </p:nvSpPr>
+        <p:spPr>
+          <a:xfrm rot="10800000">
+            <a:off x="3361266" y="2441552"/>
+            <a:ext cx="135468" cy="211590"/>
+          </a:xfrm>
+          <a:prstGeom prst="rect">
+            <a:avLst/>
+          </a:prstGeom>
+          <a:noFill/>
+          <a:ln w="3175" cmpd="sng">
+            <a:solidFill>
+              <a:schemeClr val="tx1"/>
+            </a:solidFill>
+          </a:ln>
+          <a:effectLst/>
+        </p:spPr>
+        <p:style>
+          <a:lnRef idx="1">
+            <a:schemeClr val="accent1"/>
+          </a:lnRef>
+          <a:fillRef idx="3">
+            <a:schemeClr val="accent1"/>
+          </a:fillRef>
+          <a:effectRef idx="2">
+            <a:schemeClr val="accent1"/>
+          </a:effectRef>
+          <a:fontRef idx="minor">
+            <a:schemeClr val="lt1"/>
+          </a:fontRef>
+        </p:style>
+        <p:txBody>
+          <a:bodyPr rtlCol="0" anchor="ctr"/>
+          <a:lstStyle/>
+          <a:p>
+            <a:pPr algn="ctr"/>
+            <a:endParaRPr lang="fr-FR"/>
+          </a:p>
+        </p:txBody>
+      </p:sp>
+      <p:sp>
+        <p:nvSpPr>
+          <p:cNvPr id="165" name="Rectangle 164"/>
+          <p:cNvSpPr/>
+          <p:nvPr/>
+        </p:nvSpPr>
+        <p:spPr>
+          <a:xfrm rot="10800000">
+            <a:off x="3367176" y="3454252"/>
+            <a:ext cx="138022" cy="292094"/>
+          </a:xfrm>
+          <a:prstGeom prst="rect">
+            <a:avLst/>
+          </a:prstGeom>
+          <a:noFill/>
+          <a:ln w="3175" cmpd="sng">
+            <a:solidFill>
+              <a:schemeClr val="tx1"/>
+            </a:solidFill>
+          </a:ln>
+          <a:effectLst/>
+        </p:spPr>
+        <p:style>
+          <a:lnRef idx="1">
+            <a:schemeClr val="accent1"/>
+          </a:lnRef>
+          <a:fillRef idx="3">
+            <a:schemeClr val="accent1"/>
+          </a:fillRef>
+          <a:effectRef idx="2">
+            <a:schemeClr val="accent1"/>
+          </a:effectRef>
+          <a:fontRef idx="minor">
+            <a:schemeClr val="lt1"/>
+          </a:fontRef>
+        </p:style>
+        <p:txBody>
+          <a:bodyPr rtlCol="0" anchor="ctr"/>
+          <a:lstStyle/>
+          <a:p>
+            <a:pPr algn="ctr"/>
+            <a:endParaRPr lang="fr-FR"/>
+          </a:p>
+        </p:txBody>
+      </p:sp>
+      <p:sp>
+        <p:nvSpPr>
+          <p:cNvPr id="167" name="Rectangle 166"/>
+          <p:cNvSpPr/>
+          <p:nvPr/>
+        </p:nvSpPr>
+        <p:spPr>
+          <a:xfrm rot="16200000">
+            <a:off x="2952434" y="1970956"/>
+            <a:ext cx="135468" cy="272308"/>
+          </a:xfrm>
+          <a:prstGeom prst="rect">
+            <a:avLst/>
+          </a:prstGeom>
+          <a:noFill/>
+          <a:ln w="3175" cmpd="sng">
+            <a:solidFill>
+              <a:schemeClr val="tx1"/>
+            </a:solidFill>
+          </a:ln>
+          <a:effectLst/>
+        </p:spPr>
+        <p:style>
+          <a:lnRef idx="1">
+            <a:schemeClr val="accent1"/>
+          </a:lnRef>
+          <a:fillRef idx="3">
+            <a:schemeClr val="accent1"/>
+          </a:fillRef>
+          <a:effectRef idx="2">
+            <a:schemeClr val="accent1"/>
+          </a:effectRef>
+          <a:fontRef idx="minor">
+            <a:schemeClr val="lt1"/>
+          </a:fontRef>
+        </p:style>
+        <p:txBody>
+          <a:bodyPr rtlCol="0" anchor="ctr"/>
+          <a:lstStyle/>
+          <a:p>
+            <a:pPr algn="ctr"/>
+            <a:endParaRPr lang="fr-FR"/>
+          </a:p>
+        </p:txBody>
+      </p:sp>
+      <p:sp>
+        <p:nvSpPr>
+          <p:cNvPr id="168" name="Rectangle 167"/>
+          <p:cNvSpPr/>
+          <p:nvPr/>
+        </p:nvSpPr>
+        <p:spPr>
+          <a:xfrm rot="16200000">
+            <a:off x="2952434" y="2388976"/>
+            <a:ext cx="135468" cy="272308"/>
+          </a:xfrm>
+          <a:prstGeom prst="rect">
+            <a:avLst/>
+          </a:prstGeom>
+          <a:noFill/>
+          <a:ln w="3175" cmpd="sng">
+            <a:solidFill>
+              <a:schemeClr val="tx1"/>
+            </a:solidFill>
+          </a:ln>
+          <a:effectLst/>
+        </p:spPr>
+        <p:style>
+          <a:lnRef idx="1">
+            <a:schemeClr val="accent1"/>
+          </a:lnRef>
+          <a:fillRef idx="3">
+            <a:schemeClr val="accent1"/>
+          </a:fillRef>
+          <a:effectRef idx="2">
+            <a:schemeClr val="accent1"/>
+          </a:effectRef>
+          <a:fontRef idx="minor">
+            <a:schemeClr val="lt1"/>
+          </a:fontRef>
+        </p:style>
+        <p:txBody>
+          <a:bodyPr rtlCol="0" anchor="ctr"/>
+          <a:lstStyle/>
+          <a:p>
+            <a:pPr algn="ctr"/>
+            <a:endParaRPr lang="fr-FR"/>
+          </a:p>
+        </p:txBody>
+      </p:sp>
+      <p:sp>
+        <p:nvSpPr>
+          <p:cNvPr id="169" name="Rectangle 168"/>
+          <p:cNvSpPr/>
+          <p:nvPr/>
+        </p:nvSpPr>
+        <p:spPr>
+          <a:xfrm rot="16200000">
+            <a:off x="1758634" y="996209"/>
+            <a:ext cx="135468" cy="272308"/>
+          </a:xfrm>
+          <a:prstGeom prst="rect">
+            <a:avLst/>
+          </a:prstGeom>
+          <a:noFill/>
+          <a:ln w="3175" cmpd="sng">
+            <a:solidFill>
+              <a:schemeClr val="tx1"/>
+            </a:solidFill>
+          </a:ln>
+          <a:effectLst/>
+        </p:spPr>
+        <p:style>
+          <a:lnRef idx="1">
+            <a:schemeClr val="accent1"/>
+          </a:lnRef>
+          <a:fillRef idx="3">
+            <a:schemeClr val="accent1"/>
+          </a:fillRef>
+          <a:effectRef idx="2">
+            <a:schemeClr val="accent1"/>
+          </a:effectRef>
+          <a:fontRef idx="minor">
+            <a:schemeClr val="lt1"/>
+          </a:fontRef>
+        </p:style>
+        <p:txBody>
+          <a:bodyPr rtlCol="0" anchor="ctr"/>
+          <a:lstStyle/>
+          <a:p>
+            <a:pPr algn="ctr"/>
+            <a:endParaRPr lang="fr-FR"/>
+          </a:p>
+        </p:txBody>
+      </p:sp>
+      <p:sp>
+        <p:nvSpPr>
+          <p:cNvPr id="170" name="Rectangle 169"/>
+          <p:cNvSpPr/>
+          <p:nvPr/>
+        </p:nvSpPr>
+        <p:spPr>
+          <a:xfrm rot="16200000">
+            <a:off x="1774880" y="1457575"/>
+            <a:ext cx="135468" cy="272308"/>
+          </a:xfrm>
+          <a:prstGeom prst="rect">
+            <a:avLst/>
+          </a:prstGeom>
+          <a:noFill/>
+          <a:ln w="3175" cmpd="sng">
+            <a:solidFill>
+              <a:schemeClr val="tx1"/>
+            </a:solidFill>
+          </a:ln>
+          <a:effectLst/>
+        </p:spPr>
+        <p:style>
+          <a:lnRef idx="1">
+            <a:schemeClr val="accent1"/>
+          </a:lnRef>
+          <a:fillRef idx="3">
+            <a:schemeClr val="accent1"/>
+          </a:fillRef>
+          <a:effectRef idx="2">
+            <a:schemeClr val="accent1"/>
+          </a:effectRef>
+          <a:fontRef idx="minor">
+            <a:schemeClr val="lt1"/>
+          </a:fontRef>
+        </p:style>
+        <p:txBody>
+          <a:bodyPr rtlCol="0" anchor="ctr"/>
+          <a:lstStyle/>
+          <a:p>
+            <a:pPr algn="ctr"/>
+            <a:endParaRPr lang="fr-FR"/>
+          </a:p>
+        </p:txBody>
+      </p:sp>
+      <p:sp>
+        <p:nvSpPr>
+          <p:cNvPr id="171" name="Rectangle 170"/>
+          <p:cNvSpPr/>
+          <p:nvPr/>
+        </p:nvSpPr>
+        <p:spPr>
+          <a:xfrm rot="16200000">
+            <a:off x="1782659" y="1862962"/>
+            <a:ext cx="135468" cy="272308"/>
+          </a:xfrm>
+          <a:prstGeom prst="rect">
+            <a:avLst/>
+          </a:prstGeom>
+          <a:noFill/>
+          <a:ln w="3175" cmpd="sng">
+            <a:solidFill>
+              <a:schemeClr val="tx1"/>
+            </a:solidFill>
+          </a:ln>
+          <a:effectLst/>
+        </p:spPr>
+        <p:style>
+          <a:lnRef idx="1">
+            <a:schemeClr val="accent1"/>
+          </a:lnRef>
+          <a:fillRef idx="3">
+            <a:schemeClr val="accent1"/>
+          </a:fillRef>
+          <a:effectRef idx="2">
+            <a:schemeClr val="accent1"/>
+          </a:effectRef>
+          <a:fontRef idx="minor">
+            <a:schemeClr val="lt1"/>
+          </a:fontRef>
+        </p:style>
+        <p:txBody>
+          <a:bodyPr rtlCol="0" anchor="ctr"/>
+          <a:lstStyle/>
+          <a:p>
+            <a:pPr algn="ctr"/>
+            <a:endParaRPr lang="fr-FR"/>
+          </a:p>
+        </p:txBody>
+      </p:sp>
+      <p:sp>
+        <p:nvSpPr>
+          <p:cNvPr id="172" name="Rectangle 171"/>
+          <p:cNvSpPr/>
+          <p:nvPr/>
+        </p:nvSpPr>
+        <p:spPr>
+          <a:xfrm rot="10800000">
+            <a:off x="1827054" y="2222510"/>
+            <a:ext cx="135468" cy="454999"/>
+          </a:xfrm>
+          <a:prstGeom prst="rect">
+            <a:avLst/>
+          </a:prstGeom>
+          <a:noFill/>
+          <a:ln w="3175" cmpd="sng">
+            <a:solidFill>
+              <a:schemeClr val="tx1"/>
+            </a:solidFill>
+          </a:ln>
+          <a:effectLst/>
+        </p:spPr>
+        <p:style>
+          <a:lnRef idx="1">
+            <a:schemeClr val="accent1"/>
+          </a:lnRef>
+          <a:fillRef idx="3">
+            <a:schemeClr val="accent1"/>
+          </a:fillRef>
+          <a:effectRef idx="2">
+            <a:schemeClr val="accent1"/>
+          </a:effectRef>
+          <a:fontRef idx="minor">
+            <a:schemeClr val="lt1"/>
+          </a:fontRef>
+        </p:style>
+        <p:txBody>
+          <a:bodyPr rtlCol="0" anchor="ctr"/>
+          <a:lstStyle/>
+          <a:p>
+            <a:pPr algn="ctr"/>
+            <a:endParaRPr lang="fr-FR"/>
+          </a:p>
+        </p:txBody>
+      </p:sp>
+      <p:sp>
+        <p:nvSpPr>
+          <p:cNvPr id="173" name="Rectangle 172"/>
+          <p:cNvSpPr/>
+          <p:nvPr/>
+        </p:nvSpPr>
+        <p:spPr>
+          <a:xfrm rot="10800000">
+            <a:off x="1827054" y="2729345"/>
+            <a:ext cx="135468" cy="454999"/>
+          </a:xfrm>
+          <a:prstGeom prst="rect">
+            <a:avLst/>
+          </a:prstGeom>
+          <a:noFill/>
+          <a:ln w="3175" cmpd="sng">
+            <a:solidFill>
+              <a:schemeClr val="tx1"/>
+            </a:solidFill>
+          </a:ln>
+          <a:effectLst/>
+        </p:spPr>
+        <p:style>
+          <a:lnRef idx="1">
+            <a:schemeClr val="accent1"/>
+          </a:lnRef>
+          <a:fillRef idx="3">
+            <a:schemeClr val="accent1"/>
+          </a:fillRef>
+          <a:effectRef idx="2">
+            <a:schemeClr val="accent1"/>
+          </a:effectRef>
+          <a:fontRef idx="minor">
+            <a:schemeClr val="lt1"/>
+          </a:fontRef>
+        </p:style>
+        <p:txBody>
+          <a:bodyPr rtlCol="0" anchor="ctr"/>
+          <a:lstStyle/>
+          <a:p>
+            <a:pPr algn="ctr"/>
+            <a:endParaRPr lang="fr-FR"/>
+          </a:p>
+        </p:txBody>
+      </p:sp>
+      <p:sp>
+        <p:nvSpPr>
+          <p:cNvPr id="174" name="Rectangle 173"/>
+          <p:cNvSpPr/>
+          <p:nvPr/>
+        </p:nvSpPr>
+        <p:spPr>
+          <a:xfrm rot="10800000">
+            <a:off x="1832401" y="3240691"/>
+            <a:ext cx="135468" cy="454999"/>
+          </a:xfrm>
+          <a:prstGeom prst="rect">
+            <a:avLst/>
+          </a:prstGeom>
+          <a:noFill/>
+          <a:ln w="3175" cmpd="sng">
+            <a:solidFill>
+              <a:schemeClr val="tx1"/>
+            </a:solidFill>
+          </a:ln>
+          <a:effectLst/>
+        </p:spPr>
+        <p:style>
+          <a:lnRef idx="1">
+            <a:schemeClr val="accent1"/>
+          </a:lnRef>
+          <a:fillRef idx="3">
+            <a:schemeClr val="accent1"/>
+          </a:fillRef>
+          <a:effectRef idx="2">
+            <a:schemeClr val="accent1"/>
+          </a:effectRef>
+          <a:fontRef idx="minor">
+            <a:schemeClr val="lt1"/>
+          </a:fontRef>
+        </p:style>
+        <p:txBody>
+          <a:bodyPr rtlCol="0" anchor="ctr"/>
+          <a:lstStyle/>
+          <a:p>
+            <a:pPr algn="ctr"/>
+            <a:endParaRPr lang="fr-FR"/>
+          </a:p>
+        </p:txBody>
+      </p:sp>
+      <p:sp>
+        <p:nvSpPr>
+          <p:cNvPr id="175" name="Rectangle 174"/>
+          <p:cNvSpPr/>
+          <p:nvPr/>
+        </p:nvSpPr>
+        <p:spPr>
+          <a:xfrm rot="16200000">
+            <a:off x="1702874" y="3947548"/>
+            <a:ext cx="135468" cy="211590"/>
+          </a:xfrm>
+          <a:prstGeom prst="rect">
+            <a:avLst/>
+          </a:prstGeom>
+          <a:noFill/>
+          <a:ln w="3175" cmpd="sng">
+            <a:solidFill>
+              <a:schemeClr val="tx1"/>
+            </a:solidFill>
+          </a:ln>
+          <a:effectLst/>
+        </p:spPr>
+        <p:style>
+          <a:lnRef idx="1">
+            <a:schemeClr val="accent1"/>
+          </a:lnRef>
+          <a:fillRef idx="3">
+            <a:schemeClr val="accent1"/>
+          </a:fillRef>
+          <a:effectRef idx="2">
+            <a:schemeClr val="accent1"/>
+          </a:effectRef>
+          <a:fontRef idx="minor">
+            <a:schemeClr val="lt1"/>
+          </a:fontRef>
+        </p:style>
+        <p:txBody>
+          <a:bodyPr rtlCol="0" anchor="ctr"/>
+          <a:lstStyle/>
+          <a:p>
+            <a:pPr algn="ctr"/>
+            <a:endParaRPr lang="fr-FR"/>
+          </a:p>
+        </p:txBody>
+      </p:sp>
+      <p:sp>
+        <p:nvSpPr>
+          <p:cNvPr id="176" name="Rectangle 175"/>
+          <p:cNvSpPr/>
+          <p:nvPr/>
+        </p:nvSpPr>
+        <p:spPr>
+          <a:xfrm rot="16200000">
+            <a:off x="2097536" y="3947550"/>
+            <a:ext cx="135468" cy="211590"/>
+          </a:xfrm>
+          <a:prstGeom prst="rect">
+            <a:avLst/>
+          </a:prstGeom>
+          <a:noFill/>
+          <a:ln w="3175" cmpd="sng">
+            <a:solidFill>
+              <a:schemeClr val="tx1"/>
+            </a:solidFill>
+          </a:ln>
+          <a:effectLst/>
+        </p:spPr>
+        <p:style>
+          <a:lnRef idx="1">
+            <a:schemeClr val="accent1"/>
+          </a:lnRef>
+          <a:fillRef idx="3">
+            <a:schemeClr val="accent1"/>
+          </a:fillRef>
+          <a:effectRef idx="2">
+            <a:schemeClr val="accent1"/>
+          </a:effectRef>
+          <a:fontRef idx="minor">
+            <a:schemeClr val="lt1"/>
+          </a:fontRef>
+        </p:style>
+        <p:txBody>
+          <a:bodyPr rtlCol="0" anchor="ctr"/>
+          <a:lstStyle/>
+          <a:p>
+            <a:pPr algn="ctr"/>
+            <a:endParaRPr lang="fr-FR"/>
+          </a:p>
+        </p:txBody>
+      </p:sp>
+      <p:sp>
+        <p:nvSpPr>
+          <p:cNvPr id="177" name="Rectangle 176"/>
+          <p:cNvSpPr/>
+          <p:nvPr/>
+        </p:nvSpPr>
+        <p:spPr>
+          <a:xfrm rot="10800000">
+            <a:off x="2253246" y="2178111"/>
+            <a:ext cx="135468" cy="211590"/>
+          </a:xfrm>
+          <a:prstGeom prst="rect">
+            <a:avLst/>
+          </a:prstGeom>
+          <a:noFill/>
+          <a:ln w="3175" cmpd="sng">
+            <a:solidFill>
+              <a:schemeClr val="tx1"/>
+            </a:solidFill>
+          </a:ln>
+          <a:effectLst/>
+        </p:spPr>
+        <p:style>
+          <a:lnRef idx="1">
+            <a:schemeClr val="accent1"/>
+          </a:lnRef>
+          <a:fillRef idx="3">
+            <a:schemeClr val="accent1"/>
+          </a:fillRef>
+          <a:effectRef idx="2">
+            <a:schemeClr val="accent1"/>
+          </a:effectRef>
+          <a:fontRef idx="minor">
+            <a:schemeClr val="lt1"/>
+          </a:fontRef>
+        </p:style>
+        <p:txBody>
+          <a:bodyPr rtlCol="0" anchor="ctr"/>
+          <a:lstStyle/>
+          <a:p>
+            <a:pPr algn="ctr"/>
+            <a:endParaRPr lang="fr-FR"/>
+          </a:p>
+        </p:txBody>
+      </p:sp>
+      <p:sp>
+        <p:nvSpPr>
+          <p:cNvPr id="178" name="Rectangle 177"/>
+          <p:cNvSpPr/>
+          <p:nvPr/>
+        </p:nvSpPr>
+        <p:spPr>
+          <a:xfrm rot="10800000" flipV="1">
+            <a:off x="2253246" y="1938923"/>
+            <a:ext cx="135468" cy="211590"/>
+          </a:xfrm>
+          <a:prstGeom prst="rect">
+            <a:avLst/>
+          </a:prstGeom>
+          <a:noFill/>
+          <a:ln w="3175" cmpd="sng">
+            <a:solidFill>
+              <a:schemeClr val="tx1"/>
+            </a:solidFill>
+          </a:ln>
+          <a:effectLst/>
+        </p:spPr>
+        <p:style>
+          <a:lnRef idx="1">
+            <a:schemeClr val="accent1"/>
+          </a:lnRef>
+          <a:fillRef idx="3">
+            <a:schemeClr val="accent1"/>
+          </a:fillRef>
+          <a:effectRef idx="2">
+            <a:schemeClr val="accent1"/>
+          </a:effectRef>
+          <a:fontRef idx="minor">
+            <a:schemeClr val="lt1"/>
+          </a:fontRef>
+        </p:style>
+        <p:txBody>
+          <a:bodyPr rtlCol="0" anchor="ctr"/>
+          <a:lstStyle/>
+          <a:p>
+            <a:pPr algn="ctr"/>
+            <a:endParaRPr lang="fr-FR"/>
+          </a:p>
+        </p:txBody>
+      </p:sp>
+      <p:sp>
+        <p:nvSpPr>
+          <p:cNvPr id="179" name="Rectangle 178"/>
+          <p:cNvSpPr/>
+          <p:nvPr/>
+        </p:nvSpPr>
+        <p:spPr>
+          <a:xfrm rot="10800000">
+            <a:off x="2253246" y="2417221"/>
+            <a:ext cx="135468" cy="211590"/>
+          </a:xfrm>
+          <a:prstGeom prst="rect">
+            <a:avLst/>
+          </a:prstGeom>
+          <a:noFill/>
+          <a:ln w="3175" cmpd="sng">
+            <a:solidFill>
+              <a:schemeClr val="tx1"/>
+            </a:solidFill>
+          </a:ln>
+          <a:effectLst/>
+        </p:spPr>
+        <p:style>
+          <a:lnRef idx="1">
+            <a:schemeClr val="accent1"/>
+          </a:lnRef>
+          <a:fillRef idx="3">
+            <a:schemeClr val="accent1"/>
+          </a:fillRef>
+          <a:effectRef idx="2">
+            <a:schemeClr val="accent1"/>
+          </a:effectRef>
+          <a:fontRef idx="minor">
+            <a:schemeClr val="lt1"/>
+          </a:fontRef>
+        </p:style>
+        <p:txBody>
+          <a:bodyPr rtlCol="0" anchor="ctr"/>
+          <a:lstStyle/>
+          <a:p>
+            <a:pPr algn="ctr"/>
+            <a:endParaRPr lang="fr-FR"/>
+          </a:p>
+        </p:txBody>
+      </p:sp>
+      <p:sp>
+        <p:nvSpPr>
+          <p:cNvPr id="180" name="Rectangle 179"/>
+          <p:cNvSpPr/>
+          <p:nvPr/>
+        </p:nvSpPr>
+        <p:spPr>
+          <a:xfrm rot="10800000">
+            <a:off x="2258338" y="3223754"/>
+            <a:ext cx="135468" cy="211590"/>
+          </a:xfrm>
+          <a:prstGeom prst="rect">
+            <a:avLst/>
+          </a:prstGeom>
+          <a:noFill/>
+          <a:ln w="3175" cmpd="sng">
+            <a:solidFill>
+              <a:schemeClr val="tx1"/>
+            </a:solidFill>
+          </a:ln>
+          <a:effectLst/>
+        </p:spPr>
+        <p:style>
+          <a:lnRef idx="1">
+            <a:schemeClr val="accent1"/>
+          </a:lnRef>
+          <a:fillRef idx="3">
+            <a:schemeClr val="accent1"/>
+          </a:fillRef>
+          <a:effectRef idx="2">
+            <a:schemeClr val="accent1"/>
+          </a:effectRef>
+          <a:fontRef idx="minor">
+            <a:schemeClr val="lt1"/>
+          </a:fontRef>
+        </p:style>
+        <p:txBody>
+          <a:bodyPr rtlCol="0" anchor="ctr"/>
+          <a:lstStyle/>
+          <a:p>
+            <a:pPr algn="ctr"/>
+            <a:endParaRPr lang="fr-FR"/>
+          </a:p>
+        </p:txBody>
+      </p:sp>
+      <p:sp>
+        <p:nvSpPr>
+          <p:cNvPr id="181" name="Rectangle 180"/>
+          <p:cNvSpPr/>
+          <p:nvPr/>
+        </p:nvSpPr>
+        <p:spPr>
+          <a:xfrm rot="10800000" flipV="1">
+            <a:off x="2258338" y="2984566"/>
+            <a:ext cx="135468" cy="211590"/>
+          </a:xfrm>
+          <a:prstGeom prst="rect">
+            <a:avLst/>
+          </a:prstGeom>
+          <a:noFill/>
+          <a:ln w="3175" cmpd="sng">
+            <a:solidFill>
+              <a:schemeClr val="tx1"/>
+            </a:solidFill>
+          </a:ln>
+          <a:effectLst/>
+        </p:spPr>
+        <p:style>
+          <a:lnRef idx="1">
+            <a:schemeClr val="accent1"/>
+          </a:lnRef>
+          <a:fillRef idx="3">
+            <a:schemeClr val="accent1"/>
+          </a:fillRef>
+          <a:effectRef idx="2">
+            <a:schemeClr val="accent1"/>
+          </a:effectRef>
+          <a:fontRef idx="minor">
+            <a:schemeClr val="lt1"/>
+          </a:fontRef>
+        </p:style>
+        <p:txBody>
+          <a:bodyPr rtlCol="0" anchor="ctr"/>
+          <a:lstStyle/>
+          <a:p>
+            <a:pPr algn="ctr"/>
+            <a:endParaRPr lang="fr-FR"/>
+          </a:p>
+        </p:txBody>
+      </p:sp>
+      <p:sp>
+        <p:nvSpPr>
+          <p:cNvPr id="182" name="Rectangle 181"/>
+          <p:cNvSpPr/>
+          <p:nvPr/>
+        </p:nvSpPr>
+        <p:spPr>
+          <a:xfrm rot="10800000">
+            <a:off x="2258338" y="3462864"/>
+            <a:ext cx="135468" cy="211590"/>
+          </a:xfrm>
+          <a:prstGeom prst="rect">
+            <a:avLst/>
+          </a:prstGeom>
+          <a:noFill/>
+          <a:ln w="3175" cmpd="sng">
+            <a:solidFill>
+              <a:schemeClr val="tx1"/>
+            </a:solidFill>
+          </a:ln>
+          <a:effectLst/>
+        </p:spPr>
+        <p:style>
+          <a:lnRef idx="1">
+            <a:schemeClr val="accent1"/>
+          </a:lnRef>
+          <a:fillRef idx="3">
+            <a:schemeClr val="accent1"/>
+          </a:fillRef>
+          <a:effectRef idx="2">
+            <a:schemeClr val="accent1"/>
+          </a:effectRef>
+          <a:fontRef idx="minor">
+            <a:schemeClr val="lt1"/>
+          </a:fontRef>
+        </p:style>
+        <p:txBody>
+          <a:bodyPr rtlCol="0" anchor="ctr"/>
+          <a:lstStyle/>
+          <a:p>
+            <a:pPr algn="ctr"/>
+            <a:endParaRPr lang="fr-FR"/>
           </a:p>
         </p:txBody>
       </p:sp>

</xml_diff>